<commit_message>
Ss needs to be added in ppt
</commit_message>
<xml_diff>
--- a/quizapp.pptx
+++ b/quizapp.pptx
@@ -5,22 +5,26 @@
     <p:sldMasterId id="2147483745" r:id="rId1"/>
   </p:sldMasterIdLst>
   <p:notesMasterIdLst>
-    <p:notesMasterId r:id="rId12"/>
+    <p:notesMasterId r:id="rId16"/>
   </p:notesMasterIdLst>
   <p:handoutMasterIdLst>
-    <p:handoutMasterId r:id="rId13"/>
+    <p:handoutMasterId r:id="rId17"/>
   </p:handoutMasterIdLst>
   <p:sldIdLst>
-    <p:sldId id="305" r:id="rId2"/>
-    <p:sldId id="308" r:id="rId3"/>
-    <p:sldId id="310" r:id="rId4"/>
-    <p:sldId id="311" r:id="rId5"/>
-    <p:sldId id="312" r:id="rId6"/>
-    <p:sldId id="313" r:id="rId7"/>
-    <p:sldId id="314" r:id="rId8"/>
-    <p:sldId id="295" r:id="rId9"/>
-    <p:sldId id="315" r:id="rId10"/>
-    <p:sldId id="316" r:id="rId11"/>
+    <p:sldId id="308" r:id="rId2"/>
+    <p:sldId id="310" r:id="rId3"/>
+    <p:sldId id="311" r:id="rId4"/>
+    <p:sldId id="324" r:id="rId5"/>
+    <p:sldId id="305" r:id="rId6"/>
+    <p:sldId id="323" r:id="rId7"/>
+    <p:sldId id="325" r:id="rId8"/>
+    <p:sldId id="326" r:id="rId9"/>
+    <p:sldId id="327" r:id="rId10"/>
+    <p:sldId id="328" r:id="rId11"/>
+    <p:sldId id="319" r:id="rId12"/>
+    <p:sldId id="295" r:id="rId13"/>
+    <p:sldId id="315" r:id="rId14"/>
+    <p:sldId id="316" r:id="rId15"/>
   </p:sldIdLst>
   <p:sldSz cx="9144000" cy="5143500" type="screen16x9"/>
   <p:notesSz cx="6858000" cy="9144000"/>
@@ -124,13 +128,17 @@
       <p14:sectionLst xmlns:p14="http://schemas.microsoft.com/office/powerpoint/2010/main">
         <p14:section name="Slide Types" id="{32FB2BEB-3125-A740-9BAC-0B48254924AF}">
           <p14:sldIdLst>
-            <p14:sldId id="305"/>
             <p14:sldId id="308"/>
             <p14:sldId id="310"/>
             <p14:sldId id="311"/>
-            <p14:sldId id="312"/>
-            <p14:sldId id="313"/>
-            <p14:sldId id="314"/>
+            <p14:sldId id="324"/>
+            <p14:sldId id="305"/>
+            <p14:sldId id="323"/>
+            <p14:sldId id="325"/>
+            <p14:sldId id="326"/>
+            <p14:sldId id="327"/>
+            <p14:sldId id="328"/>
+            <p14:sldId id="319"/>
             <p14:sldId id="295"/>
             <p14:sldId id="315"/>
             <p14:sldId id="316"/>
@@ -267,7 +275,7 @@
               <a:rPr lang="en-US" smtClean="0">
                 <a:latin typeface="Arial Narrow"/>
               </a:rPr>
-              <a:t>12/4/2018</a:t>
+              <a:t>12/5/2018</a:t>
             </a:fld>
             <a:endParaRPr lang="en-US" dirty="0">
               <a:latin typeface="Arial Narrow"/>
@@ -445,7 +453,7 @@
             <a:fld id="{F2487051-C2FA-694B-8817-08E3CE5FEDD7}" type="datetimeFigureOut">
               <a:rPr lang="en-US" smtClean="0"/>
               <a:pPr/>
-              <a:t>12/4/2018</a:t>
+              <a:t>12/5/2018</a:t>
             </a:fld>
             <a:endParaRPr lang="en-US" dirty="0"/>
           </a:p>
@@ -783,7 +791,7 @@
             <a:fld id="{31C12B0C-0C07-E641-8F34-10A0521EE122}" type="slidenum">
               <a:rPr lang="en-US" smtClean="0"/>
               <a:pPr/>
-              <a:t>2</a:t>
+              <a:t>1</a:t>
             </a:fld>
             <a:endParaRPr lang="en-US" dirty="0"/>
           </a:p>
@@ -805,14 +813,6 @@
 <file path=ppt/slideLayouts/slideLayout1.xml><?xml version="1.0" encoding="utf-8"?>
 <p:sldLayout xmlns:a="http://schemas.openxmlformats.org/drawingml/2006/main" xmlns:r="http://schemas.openxmlformats.org/officeDocument/2006/relationships" xmlns:p="http://schemas.openxmlformats.org/presentationml/2006/main" preserve="1" userDrawn="1">
   <p:cSld name="Title Slide">
-    <p:bg>
-      <p:bgPr>
-        <a:solidFill>
-          <a:srgbClr val="1B3651"/>
-        </a:solidFill>
-        <a:effectLst/>
-      </p:bgPr>
-    </p:bg>
     <p:spTree>
       <p:nvGrpSpPr>
         <p:cNvPr id="1" name=""/>
@@ -1112,14 +1112,6 @@
 <file path=ppt/slideLayouts/slideLayout10.xml><?xml version="1.0" encoding="utf-8"?>
 <p:sldLayout xmlns:a="http://schemas.openxmlformats.org/drawingml/2006/main" xmlns:r="http://schemas.openxmlformats.org/officeDocument/2006/relationships" xmlns:p="http://schemas.openxmlformats.org/presentationml/2006/main" preserve="1" userDrawn="1">
   <p:cSld name="Thank You">
-    <p:bg>
-      <p:bgPr>
-        <a:solidFill>
-          <a:srgbClr val="1B3651"/>
-        </a:solidFill>
-        <a:effectLst/>
-      </p:bgPr>
-    </p:bg>
     <p:spTree>
       <p:nvGrpSpPr>
         <p:cNvPr id="1" name=""/>
@@ -1327,16 +1319,6 @@
 <file path=ppt/slideLayouts/slideLayout2.xml><?xml version="1.0" encoding="utf-8"?>
 <p:sldLayout xmlns:a="http://schemas.openxmlformats.org/drawingml/2006/main" xmlns:r="http://schemas.openxmlformats.org/officeDocument/2006/relationships" xmlns:p="http://schemas.openxmlformats.org/presentationml/2006/main" preserve="1" userDrawn="1">
   <p:cSld name="Speaker Introduction">
-    <p:bg>
-      <p:bgPr>
-        <a:solidFill>
-          <a:schemeClr val="bg1">
-            <a:lumMod val="85000"/>
-          </a:schemeClr>
-        </a:solidFill>
-        <a:effectLst/>
-      </p:bgPr>
-    </p:bg>
     <p:spTree>
       <p:nvGrpSpPr>
         <p:cNvPr id="1" name=""/>
@@ -1755,14 +1737,6 @@
 <file path=ppt/slideLayouts/slideLayout3.xml><?xml version="1.0" encoding="utf-8"?>
 <p:sldLayout xmlns:a="http://schemas.openxmlformats.org/drawingml/2006/main" xmlns:r="http://schemas.openxmlformats.org/officeDocument/2006/relationships" xmlns:p="http://schemas.openxmlformats.org/presentationml/2006/main" preserve="1" userDrawn="1">
   <p:cSld name="Agenda">
-    <p:bg>
-      <p:bgPr>
-        <a:solidFill>
-          <a:schemeClr val="bg1"/>
-        </a:solidFill>
-        <a:effectLst/>
-      </p:bgPr>
-    </p:bg>
     <p:spTree>
       <p:nvGrpSpPr>
         <p:cNvPr id="1" name=""/>
@@ -2014,14 +1988,6 @@
 <file path=ppt/slideLayouts/slideLayout4.xml><?xml version="1.0" encoding="utf-8"?>
 <p:sldLayout xmlns:a="http://schemas.openxmlformats.org/drawingml/2006/main" xmlns:r="http://schemas.openxmlformats.org/officeDocument/2006/relationships" xmlns:p="http://schemas.openxmlformats.org/presentationml/2006/main" preserve="1" userDrawn="1">
   <p:cSld name="Section Header Dark">
-    <p:bg>
-      <p:bgPr>
-        <a:solidFill>
-          <a:srgbClr val="1B3651"/>
-        </a:solidFill>
-        <a:effectLst/>
-      </p:bgPr>
-    </p:bg>
     <p:spTree>
       <p:nvGrpSpPr>
         <p:cNvPr id="1" name=""/>
@@ -2357,14 +2323,6 @@
 <file path=ppt/slideLayouts/slideLayout5.xml><?xml version="1.0" encoding="utf-8"?>
 <p:sldLayout xmlns:a="http://schemas.openxmlformats.org/drawingml/2006/main" xmlns:r="http://schemas.openxmlformats.org/officeDocument/2006/relationships" xmlns:p="http://schemas.openxmlformats.org/presentationml/2006/main" preserve="1" userDrawn="1">
   <p:cSld name="Text + Image">
-    <p:bg>
-      <p:bgPr>
-        <a:solidFill>
-          <a:srgbClr val="1B3651"/>
-        </a:solidFill>
-        <a:effectLst/>
-      </p:bgPr>
-    </p:bg>
     <p:spTree>
       <p:nvGrpSpPr>
         <p:cNvPr id="1" name=""/>
@@ -2574,14 +2532,6 @@
 <file path=ppt/slideLayouts/slideLayout6.xml><?xml version="1.0" encoding="utf-8"?>
 <p:sldLayout xmlns:a="http://schemas.openxmlformats.org/drawingml/2006/main" xmlns:r="http://schemas.openxmlformats.org/officeDocument/2006/relationships" xmlns:p="http://schemas.openxmlformats.org/presentationml/2006/main" preserve="1" userDrawn="1">
   <p:cSld name="Image as Background">
-    <p:bg>
-      <p:bgPr>
-        <a:solidFill>
-          <a:schemeClr val="bg1"/>
-        </a:solidFill>
-        <a:effectLst/>
-      </p:bgPr>
-    </p:bg>
     <p:spTree>
       <p:nvGrpSpPr>
         <p:cNvPr id="1" name=""/>
@@ -2717,16 +2667,6 @@
 <file path=ppt/slideLayouts/slideLayout7.xml><?xml version="1.0" encoding="utf-8"?>
 <p:sldLayout xmlns:a="http://schemas.openxmlformats.org/drawingml/2006/main" xmlns:r="http://schemas.openxmlformats.org/officeDocument/2006/relationships" xmlns:p="http://schemas.openxmlformats.org/presentationml/2006/main" preserve="1" userDrawn="1">
   <p:cSld name="Section Header Light">
-    <p:bg>
-      <p:bgPr>
-        <a:solidFill>
-          <a:schemeClr val="bg1">
-            <a:lumMod val="85000"/>
-          </a:schemeClr>
-        </a:solidFill>
-        <a:effectLst/>
-      </p:bgPr>
-    </p:bg>
     <p:spTree>
       <p:nvGrpSpPr>
         <p:cNvPr id="1" name=""/>
@@ -3056,14 +2996,6 @@
 <file path=ppt/slideLayouts/slideLayout8.xml><?xml version="1.0" encoding="utf-8"?>
 <p:sldLayout xmlns:a="http://schemas.openxmlformats.org/drawingml/2006/main" xmlns:r="http://schemas.openxmlformats.org/officeDocument/2006/relationships" xmlns:p="http://schemas.openxmlformats.org/presentationml/2006/main" preserve="1" userDrawn="1">
   <p:cSld name="Impact Statement ">
-    <p:bg>
-      <p:bgPr>
-        <a:solidFill>
-          <a:schemeClr val="bg1"/>
-        </a:solidFill>
-        <a:effectLst/>
-      </p:bgPr>
-    </p:bg>
     <p:spTree>
       <p:nvGrpSpPr>
         <p:cNvPr id="1" name=""/>
@@ -3268,16 +3200,6 @@
 <file path=ppt/slideLayouts/slideLayout9.xml><?xml version="1.0" encoding="utf-8"?>
 <p:sldLayout xmlns:a="http://schemas.openxmlformats.org/drawingml/2006/main" xmlns:r="http://schemas.openxmlformats.org/officeDocument/2006/relationships" xmlns:p="http://schemas.openxmlformats.org/presentationml/2006/main" preserve="1" userDrawn="1">
   <p:cSld name="Data Point">
-    <p:bg>
-      <p:bgPr>
-        <a:solidFill>
-          <a:schemeClr val="bg1">
-            <a:lumMod val="85000"/>
-          </a:schemeClr>
-        </a:solidFill>
-        <a:effectLst/>
-      </p:bgPr>
-    </p:bg>
     <p:spTree>
       <p:nvGrpSpPr>
         <p:cNvPr id="1" name=""/>
@@ -3520,9 +3442,14 @@
 <p:sldMaster xmlns:a="http://schemas.openxmlformats.org/drawingml/2006/main" xmlns:r="http://schemas.openxmlformats.org/officeDocument/2006/relationships" xmlns:p="http://schemas.openxmlformats.org/presentationml/2006/main">
   <p:cSld>
     <p:bg>
-      <p:bgRef idx="1001">
-        <a:schemeClr val="bg1"/>
-      </p:bgRef>
+      <p:bgPr>
+        <a:solidFill>
+          <a:schemeClr val="tx1">
+            <a:alpha val="58000"/>
+          </a:schemeClr>
+        </a:solidFill>
+        <a:effectLst/>
+      </p:bgPr>
     </p:bg>
     <p:spTree>
       <p:nvGrpSpPr>
@@ -3961,110 +3888,6 @@
       </p:grpSpPr>
       <p:sp>
         <p:nvSpPr>
-          <p:cNvPr id="3" name="Text Placeholder 2"/>
-          <p:cNvSpPr>
-            <a:spLocks noGrp="1"/>
-          </p:cNvSpPr>
-          <p:nvPr>
-            <p:ph type="body" sz="quarter" idx="11"/>
-          </p:nvPr>
-        </p:nvSpPr>
-        <p:spPr/>
-        <p:txBody>
-          <a:bodyPr/>
-          <a:lstStyle/>
-          <a:p>
-            <a:r>
-              <a:rPr lang="en-US" dirty="0"/>
-              <a:t>Quiz app</a:t>
-            </a:r>
-          </a:p>
-        </p:txBody>
-      </p:sp>
-    </p:spTree>
-    <p:extLst>
-      <p:ext uri="{BB962C8B-B14F-4D97-AF65-F5344CB8AC3E}">
-        <p14:creationId xmlns:p14="http://schemas.microsoft.com/office/powerpoint/2010/main" val="3150657100"/>
-      </p:ext>
-    </p:extLst>
-  </p:cSld>
-  <p:clrMapOvr>
-    <a:masterClrMapping/>
-  </p:clrMapOvr>
-</p:sld>
-</file>
-
-<file path=ppt/slides/slide10.xml><?xml version="1.0" encoding="utf-8"?>
-<p:sld xmlns:a="http://schemas.openxmlformats.org/drawingml/2006/main" xmlns:r="http://schemas.openxmlformats.org/officeDocument/2006/relationships" xmlns:p="http://schemas.openxmlformats.org/presentationml/2006/main">
-  <p:cSld>
-    <p:spTree>
-      <p:nvGrpSpPr>
-        <p:cNvPr id="1" name=""/>
-        <p:cNvGrpSpPr/>
-        <p:nvPr/>
-      </p:nvGrpSpPr>
-      <p:grpSpPr>
-        <a:xfrm>
-          <a:off x="0" y="0"/>
-          <a:ext cx="0" cy="0"/>
-          <a:chOff x="0" y="0"/>
-          <a:chExt cx="0" cy="0"/>
-        </a:xfrm>
-      </p:grpSpPr>
-      <p:sp>
-        <p:nvSpPr>
-          <p:cNvPr id="2" name="Text Placeholder 1"/>
-          <p:cNvSpPr>
-            <a:spLocks noGrp="1"/>
-          </p:cNvSpPr>
-          <p:nvPr>
-            <p:ph type="body" sz="quarter" idx="10"/>
-          </p:nvPr>
-        </p:nvSpPr>
-        <p:spPr/>
-        <p:txBody>
-          <a:bodyPr/>
-          <a:lstStyle/>
-          <a:p>
-            <a:r>
-              <a:rPr lang="en-US" dirty="0"/>
-              <a:t>THANK YOU!</a:t>
-            </a:r>
-          </a:p>
-        </p:txBody>
-      </p:sp>
-    </p:spTree>
-    <p:extLst>
-      <p:ext uri="{BB962C8B-B14F-4D97-AF65-F5344CB8AC3E}">
-        <p14:creationId xmlns:p14="http://schemas.microsoft.com/office/powerpoint/2010/main" val="80668502"/>
-      </p:ext>
-    </p:extLst>
-  </p:cSld>
-  <p:clrMapOvr>
-    <a:masterClrMapping/>
-  </p:clrMapOvr>
-</p:sld>
-</file>
-
-<file path=ppt/slides/slide2.xml><?xml version="1.0" encoding="utf-8"?>
-<p:sld xmlns:a="http://schemas.openxmlformats.org/drawingml/2006/main" xmlns:r="http://schemas.openxmlformats.org/officeDocument/2006/relationships" xmlns:p="http://schemas.openxmlformats.org/presentationml/2006/main">
-  <p:cSld>
-    <p:spTree>
-      <p:nvGrpSpPr>
-        <p:cNvPr id="1" name=""/>
-        <p:cNvGrpSpPr/>
-        <p:nvPr/>
-      </p:nvGrpSpPr>
-      <p:grpSpPr>
-        <a:xfrm>
-          <a:off x="0" y="0"/>
-          <a:ext cx="0" cy="0"/>
-          <a:chOff x="0" y="0"/>
-          <a:chExt cx="0" cy="0"/>
-        </a:xfrm>
-      </p:grpSpPr>
-      <p:sp>
-        <p:nvSpPr>
           <p:cNvPr id="2" name="Text Placeholder 1"/>
           <p:cNvSpPr>
             <a:spLocks noGrp="1"/>
@@ -4182,7 +4005,7 @@
         <p:spPr>
           <a:xfrm>
             <a:off x="634517" y="605144"/>
-            <a:ext cx="3478213" cy="514444"/>
+            <a:ext cx="3937483" cy="514444"/>
           </a:xfrm>
           <a:prstGeom prst="rect">
             <a:avLst/>
@@ -4361,7 +4184,7 @@
           <a:p>
             <a:r>
               <a:rPr lang="en-US" dirty="0"/>
-              <a:t>Hello!</a:t>
+              <a:t>Hello Everyone!</a:t>
             </a:r>
           </a:p>
         </p:txBody>
@@ -4595,7 +4418,7 @@
 </p:sld>
 </file>
 
-<file path=ppt/slides/slide3.xml><?xml version="1.0" encoding="utf-8"?>
+<file path=ppt/slides/slide10.xml><?xml version="1.0" encoding="utf-8"?>
 <p:sld xmlns:a="http://schemas.openxmlformats.org/drawingml/2006/main" xmlns:r="http://schemas.openxmlformats.org/officeDocument/2006/relationships" xmlns:p="http://schemas.openxmlformats.org/presentationml/2006/main">
   <p:cSld>
     <p:spTree>
@@ -4612,38 +4435,6 @@
           <a:chExt cx="0" cy="0"/>
         </a:xfrm>
       </p:grpSpPr>
-      <p:sp>
-        <p:nvSpPr>
-          <p:cNvPr id="2" name="Text Placeholder 1"/>
-          <p:cNvSpPr>
-            <a:spLocks noGrp="1"/>
-          </p:cNvSpPr>
-          <p:nvPr>
-            <p:ph type="body" sz="quarter" idx="10"/>
-          </p:nvPr>
-        </p:nvSpPr>
-        <p:spPr>
-          <a:xfrm>
-            <a:off x="646113" y="554693"/>
-            <a:ext cx="5778593" cy="565894"/>
-          </a:xfrm>
-        </p:spPr>
-        <p:txBody>
-          <a:bodyPr>
-            <a:normAutofit lnSpcReduction="10000"/>
-          </a:bodyPr>
-          <a:lstStyle/>
-          <a:p>
-            <a:r>
-              <a:rPr lang="en-US" dirty="0">
-                <a:latin typeface="Arial"/>
-                <a:cs typeface="Arial"/>
-              </a:rPr>
-              <a:t>ADD AN AGENDA HERE…</a:t>
-            </a:r>
-          </a:p>
-        </p:txBody>
-      </p:sp>
       <p:grpSp>
         <p:nvGrpSpPr>
           <p:cNvPr id="4" name="Group 3"/>
@@ -4652,7 +4443,7 @@
         </p:nvGrpSpPr>
         <p:grpSpPr>
           <a:xfrm>
-            <a:off x="750486" y="3767772"/>
+            <a:off x="750486" y="3597492"/>
             <a:ext cx="671896" cy="675145"/>
             <a:chOff x="340088" y="1394937"/>
             <a:chExt cx="671896" cy="911261"/>
@@ -4759,7 +4550,7 @@
         </p:nvGrpSpPr>
         <p:grpSpPr>
           <a:xfrm>
-            <a:off x="750486" y="2297954"/>
+            <a:off x="750486" y="2247202"/>
             <a:ext cx="671896" cy="675145"/>
             <a:chOff x="340088" y="1394937"/>
             <a:chExt cx="671896" cy="911261"/>
@@ -4866,7 +4657,7 @@
         </p:nvGrpSpPr>
         <p:grpSpPr>
           <a:xfrm>
-            <a:off x="750486" y="3047804"/>
+            <a:off x="750488" y="2922347"/>
             <a:ext cx="671896" cy="675145"/>
             <a:chOff x="340088" y="1394937"/>
             <a:chExt cx="671896" cy="911261"/>
@@ -4977,12 +4768,14 @@
         </p:nvSpPr>
         <p:spPr>
           <a:xfrm>
-            <a:off x="899899" y="1341919"/>
+            <a:off x="974248" y="732027"/>
             <a:ext cx="6937375" cy="3528906"/>
           </a:xfrm>
         </p:spPr>
         <p:txBody>
-          <a:bodyPr/>
+          <a:bodyPr>
+            <a:normAutofit lnSpcReduction="10000"/>
+          </a:bodyPr>
           <a:lstStyle/>
           <a:p>
             <a:pPr>
@@ -4992,7 +4785,7 @@
             </a:pPr>
             <a:r>
               <a:rPr lang="en-US" dirty="0"/>
-              <a:t>Introduction</a:t>
+              <a:t>Sign up</a:t>
             </a:r>
           </a:p>
           <a:p>
@@ -5003,7 +4796,7 @@
             </a:pPr>
             <a:r>
               <a:rPr lang="en-US" dirty="0"/>
-              <a:t>What?</a:t>
+              <a:t>Sign in</a:t>
             </a:r>
           </a:p>
           <a:p>
@@ -5014,7 +4807,7 @@
             </a:pPr>
             <a:r>
               <a:rPr lang="en-US" dirty="0"/>
-              <a:t>Why?</a:t>
+              <a:t>Choose subject</a:t>
             </a:r>
           </a:p>
           <a:p>
@@ -5025,7 +4818,18 @@
             </a:pPr>
             <a:r>
               <a:rPr lang="en-US" dirty="0"/>
-              <a:t>How?</a:t>
+              <a:t>End the test</a:t>
+            </a:r>
+          </a:p>
+          <a:p>
+            <a:pPr>
+              <a:lnSpc>
+                <a:spcPct val="150000"/>
+              </a:lnSpc>
+            </a:pPr>
+            <a:r>
+              <a:rPr lang="en-US" dirty="0"/>
+              <a:t>See result</a:t>
             </a:r>
           </a:p>
           <a:p>
@@ -5036,552 +4840,25 @@
             </a:pPr>
             <a:endParaRPr lang="en-US" dirty="0"/>
           </a:p>
-        </p:txBody>
-      </p:sp>
-    </p:spTree>
-    <p:extLst>
-      <p:ext uri="{BB962C8B-B14F-4D97-AF65-F5344CB8AC3E}">
-        <p14:creationId xmlns:p14="http://schemas.microsoft.com/office/powerpoint/2010/main" val="3285409007"/>
-      </p:ext>
-    </p:extLst>
-  </p:cSld>
-  <p:clrMapOvr>
-    <a:masterClrMapping/>
-  </p:clrMapOvr>
-</p:sld>
-</file>
-
-<file path=ppt/slides/slide4.xml><?xml version="1.0" encoding="utf-8"?>
-<p:sld xmlns:a="http://schemas.openxmlformats.org/drawingml/2006/main" xmlns:r="http://schemas.openxmlformats.org/officeDocument/2006/relationships" xmlns:p="http://schemas.openxmlformats.org/presentationml/2006/main">
-  <p:cSld>
-    <p:spTree>
-      <p:nvGrpSpPr>
-        <p:cNvPr id="1" name=""/>
-        <p:cNvGrpSpPr/>
-        <p:nvPr/>
-      </p:nvGrpSpPr>
-      <p:grpSpPr>
-        <a:xfrm>
-          <a:off x="0" y="0"/>
-          <a:ext cx="0" cy="0"/>
-          <a:chOff x="0" y="0"/>
-          <a:chExt cx="0" cy="0"/>
-        </a:xfrm>
-      </p:grpSpPr>
-      <p:sp>
-        <p:nvSpPr>
-          <p:cNvPr id="2" name="Text Placeholder 1"/>
-          <p:cNvSpPr>
-            <a:spLocks noGrp="1"/>
-          </p:cNvSpPr>
-          <p:nvPr>
-            <p:ph type="body" sz="quarter" idx="15"/>
-          </p:nvPr>
-        </p:nvSpPr>
-        <p:spPr/>
-        <p:txBody>
-          <a:bodyPr/>
-          <a:lstStyle/>
-          <a:p>
-            <a:r>
-              <a:rPr lang="en-US" dirty="0"/>
-              <a:t>Introduction</a:t>
-            </a:r>
+          <a:p>
+            <a:pPr>
+              <a:lnSpc>
+                <a:spcPct val="150000"/>
+              </a:lnSpc>
+            </a:pPr>
+            <a:endParaRPr lang="en-US" dirty="0"/>
           </a:p>
         </p:txBody>
       </p:sp>
       <p:sp>
         <p:nvSpPr>
-          <p:cNvPr id="3" name="Text Placeholder 2"/>
-          <p:cNvSpPr>
-            <a:spLocks noGrp="1"/>
-          </p:cNvSpPr>
-          <p:nvPr>
-            <p:ph type="body" sz="quarter" idx="16"/>
-          </p:nvPr>
-        </p:nvSpPr>
-        <p:spPr/>
-        <p:txBody>
-          <a:bodyPr>
-            <a:normAutofit lnSpcReduction="10000"/>
-          </a:bodyPr>
-          <a:lstStyle/>
-          <a:p>
-            <a:r>
-              <a:rPr lang="en-US" dirty="0"/>
-              <a:t>PART ONE</a:t>
-            </a:r>
-          </a:p>
-        </p:txBody>
-      </p:sp>
-    </p:spTree>
-    <p:extLst>
-      <p:ext uri="{BB962C8B-B14F-4D97-AF65-F5344CB8AC3E}">
-        <p14:creationId xmlns:p14="http://schemas.microsoft.com/office/powerpoint/2010/main" val="1935180360"/>
-      </p:ext>
-    </p:extLst>
-  </p:cSld>
-  <p:clrMapOvr>
-    <a:masterClrMapping/>
-  </p:clrMapOvr>
-</p:sld>
-</file>
-
-<file path=ppt/slides/slide5.xml><?xml version="1.0" encoding="utf-8"?>
-<p:sld xmlns:a="http://schemas.openxmlformats.org/drawingml/2006/main" xmlns:r="http://schemas.openxmlformats.org/officeDocument/2006/relationships" xmlns:p="http://schemas.openxmlformats.org/presentationml/2006/main">
-  <p:cSld>
-    <p:spTree>
-      <p:nvGrpSpPr>
-        <p:cNvPr id="1" name=""/>
-        <p:cNvGrpSpPr/>
-        <p:nvPr/>
-      </p:nvGrpSpPr>
-      <p:grpSpPr>
-        <a:xfrm>
-          <a:off x="0" y="0"/>
-          <a:ext cx="0" cy="0"/>
-          <a:chOff x="0" y="0"/>
-          <a:chExt cx="0" cy="0"/>
-        </a:xfrm>
-      </p:grpSpPr>
-      <p:sp>
-        <p:nvSpPr>
-          <p:cNvPr id="2" name="Text Placeholder 1"/>
-          <p:cNvSpPr>
-            <a:spLocks noGrp="1"/>
-          </p:cNvSpPr>
-          <p:nvPr>
-            <p:ph type="body" sz="quarter" idx="10"/>
-          </p:nvPr>
-        </p:nvSpPr>
-        <p:spPr>
-          <a:xfrm>
-            <a:off x="1004888" y="1598706"/>
-            <a:ext cx="7083425" cy="1897529"/>
-          </a:xfrm>
-        </p:spPr>
-        <p:txBody>
-          <a:bodyPr>
-            <a:normAutofit/>
-          </a:bodyPr>
-          <a:lstStyle/>
-          <a:p>
-            <a:r>
-              <a:rPr lang="en-US" sz="3600" dirty="0"/>
-              <a:t>Add Text, an Image, or Both</a:t>
-            </a:r>
-          </a:p>
-        </p:txBody>
-      </p:sp>
-    </p:spTree>
-    <p:extLst>
-      <p:ext uri="{BB962C8B-B14F-4D97-AF65-F5344CB8AC3E}">
-        <p14:creationId xmlns:p14="http://schemas.microsoft.com/office/powerpoint/2010/main" val="1616447632"/>
-      </p:ext>
-    </p:extLst>
-  </p:cSld>
-  <p:clrMapOvr>
-    <a:masterClrMapping/>
-  </p:clrMapOvr>
-</p:sld>
-</file>
-
-<file path=ppt/slides/slide6.xml><?xml version="1.0" encoding="utf-8"?>
-<p:sld xmlns:a="http://schemas.openxmlformats.org/drawingml/2006/main" xmlns:r="http://schemas.openxmlformats.org/officeDocument/2006/relationships" xmlns:p="http://schemas.openxmlformats.org/presentationml/2006/main">
-  <p:cSld>
-    <p:spTree>
-      <p:nvGrpSpPr>
-        <p:cNvPr id="1" name=""/>
-        <p:cNvGrpSpPr/>
-        <p:nvPr/>
-      </p:nvGrpSpPr>
-      <p:grpSpPr>
-        <a:xfrm>
-          <a:off x="0" y="0"/>
-          <a:ext cx="0" cy="0"/>
-          <a:chOff x="0" y="0"/>
-          <a:chExt cx="0" cy="0"/>
-        </a:xfrm>
-      </p:grpSpPr>
-      <p:pic>
-        <p:nvPicPr>
-          <p:cNvPr id="5" name="Picture 4" descr="TemplateImage2.jpg"/>
-          <p:cNvPicPr>
-            <a:picLocks noChangeAspect="1"/>
-          </p:cNvPicPr>
-          <p:nvPr/>
-        </p:nvPicPr>
-        <p:blipFill rotWithShape="1">
-          <a:blip r:embed="rId2">
-            <a:alphaModFix amt="86000"/>
+          <p:cNvPr id="13" name="Text Placeholder 1">
             <a:extLst>
-              <a:ext uri="{28A0092B-C50C-407E-A947-70E740481C1C}">
-                <a14:useLocalDpi xmlns:a14="http://schemas.microsoft.com/office/drawing/2010/main" val="0"/>
+              <a:ext uri="{FF2B5EF4-FFF2-40B4-BE49-F238E27FC236}">
+                <a16:creationId xmlns:a16="http://schemas.microsoft.com/office/drawing/2014/main" id="{E161003E-FEBA-497C-BA7D-802006AE0D28}"/>
               </a:ext>
             </a:extLst>
-          </a:blip>
-          <a:srcRect t="9208" b="6876"/>
-          <a:stretch/>
-        </p:blipFill>
-        <p:spPr>
-          <a:xfrm>
-            <a:off x="-1" y="0"/>
-            <a:ext cx="9144000" cy="5143500"/>
-          </a:xfrm>
-          <a:prstGeom prst="rect">
-            <a:avLst/>
-          </a:prstGeom>
-        </p:spPr>
-      </p:pic>
-      <p:sp>
-        <p:nvSpPr>
-          <p:cNvPr id="3" name="Text Placeholder 2"/>
-          <p:cNvSpPr>
-            <a:spLocks noGrp="1"/>
-          </p:cNvSpPr>
-          <p:nvPr>
-            <p:ph type="body" sz="quarter" idx="15"/>
-          </p:nvPr>
-        </p:nvSpPr>
-        <p:spPr>
-          <a:xfrm>
-            <a:off x="0" y="4155141"/>
-            <a:ext cx="9143999" cy="1003300"/>
-          </a:xfrm>
-          <a:solidFill>
-            <a:srgbClr val="1B3651">
-              <a:alpha val="89000"/>
-            </a:srgbClr>
-          </a:solidFill>
-          <a:ln>
-            <a:noFill/>
-          </a:ln>
-        </p:spPr>
-        <p:txBody>
-          <a:bodyPr/>
-          <a:lstStyle/>
-          <a:p>
-            <a:endParaRPr lang="en-US" dirty="0"/>
-          </a:p>
-        </p:txBody>
-      </p:sp>
-    </p:spTree>
-    <p:extLst>
-      <p:ext uri="{BB962C8B-B14F-4D97-AF65-F5344CB8AC3E}">
-        <p14:creationId xmlns:p14="http://schemas.microsoft.com/office/powerpoint/2010/main" val="2919250193"/>
-      </p:ext>
-    </p:extLst>
-  </p:cSld>
-  <p:clrMapOvr>
-    <a:masterClrMapping/>
-  </p:clrMapOvr>
-</p:sld>
-</file>
-
-<file path=ppt/slides/slide7.xml><?xml version="1.0" encoding="utf-8"?>
-<p:sld xmlns:a="http://schemas.openxmlformats.org/drawingml/2006/main" xmlns:r="http://schemas.openxmlformats.org/officeDocument/2006/relationships" xmlns:p="http://schemas.openxmlformats.org/presentationml/2006/main">
-  <p:cSld>
-    <p:spTree>
-      <p:nvGrpSpPr>
-        <p:cNvPr id="1" name=""/>
-        <p:cNvGrpSpPr/>
-        <p:nvPr/>
-      </p:nvGrpSpPr>
-      <p:grpSpPr>
-        <a:xfrm>
-          <a:off x="0" y="0"/>
-          <a:ext cx="0" cy="0"/>
-          <a:chOff x="0" y="0"/>
-          <a:chExt cx="0" cy="0"/>
-        </a:xfrm>
-      </p:grpSpPr>
-      <p:sp>
-        <p:nvSpPr>
-          <p:cNvPr id="2" name="Text Placeholder 1"/>
-          <p:cNvSpPr>
-            <a:spLocks noGrp="1"/>
-          </p:cNvSpPr>
-          <p:nvPr>
-            <p:ph type="body" sz="quarter" idx="17"/>
-          </p:nvPr>
-        </p:nvSpPr>
-        <p:spPr/>
-        <p:txBody>
-          <a:bodyPr/>
-          <a:lstStyle/>
-          <a:p>
-            <a:r>
-              <a:rPr lang="en-US" dirty="0"/>
-              <a:t>SECOND SECTION HEADER GOES HERE</a:t>
-            </a:r>
-          </a:p>
-        </p:txBody>
-      </p:sp>
-      <p:sp>
-        <p:nvSpPr>
-          <p:cNvPr id="3" name="Text Placeholder 2"/>
-          <p:cNvSpPr>
-            <a:spLocks noGrp="1"/>
-          </p:cNvSpPr>
-          <p:nvPr>
-            <p:ph type="body" sz="quarter" idx="18"/>
-          </p:nvPr>
-        </p:nvSpPr>
-        <p:spPr/>
-        <p:txBody>
-          <a:bodyPr>
-            <a:normAutofit fontScale="92500" lnSpcReduction="20000"/>
-          </a:bodyPr>
-          <a:lstStyle/>
-          <a:p>
-            <a:r>
-              <a:rPr lang="en-US" dirty="0"/>
-              <a:t>PART TWO</a:t>
-            </a:r>
-          </a:p>
-        </p:txBody>
-      </p:sp>
-    </p:spTree>
-    <p:extLst>
-      <p:ext uri="{BB962C8B-B14F-4D97-AF65-F5344CB8AC3E}">
-        <p14:creationId xmlns:p14="http://schemas.microsoft.com/office/powerpoint/2010/main" val="412743457"/>
-      </p:ext>
-    </p:extLst>
-  </p:cSld>
-  <p:clrMapOvr>
-    <a:masterClrMapping/>
-  </p:clrMapOvr>
-</p:sld>
-</file>
-
-<file path=ppt/slides/slide8.xml><?xml version="1.0" encoding="utf-8"?>
-<p:sld xmlns:a="http://schemas.openxmlformats.org/drawingml/2006/main" xmlns:r="http://schemas.openxmlformats.org/officeDocument/2006/relationships" xmlns:p="http://schemas.openxmlformats.org/presentationml/2006/main">
-  <p:cSld>
-    <p:spTree>
-      <p:nvGrpSpPr>
-        <p:cNvPr id="1" name=""/>
-        <p:cNvGrpSpPr/>
-        <p:nvPr/>
-      </p:nvGrpSpPr>
-      <p:grpSpPr>
-        <a:xfrm>
-          <a:off x="0" y="0"/>
-          <a:ext cx="0" cy="0"/>
-          <a:chOff x="0" y="0"/>
-          <a:chExt cx="0" cy="0"/>
-        </a:xfrm>
-      </p:grpSpPr>
-      <p:pic>
-        <p:nvPicPr>
-          <p:cNvPr id="4" name="Picture 3" descr="7K0A0619.JPG"/>
-          <p:cNvPicPr>
-            <a:picLocks noChangeAspect="1"/>
-          </p:cNvPicPr>
-          <p:nvPr/>
-        </p:nvPicPr>
-        <p:blipFill rotWithShape="1">
-          <a:blip r:embed="rId2">
-            <a:alphaModFix amt="94000"/>
-            <a:extLst>
-              <a:ext uri="{28A0092B-C50C-407E-A947-70E740481C1C}">
-                <a14:useLocalDpi xmlns:a14="http://schemas.microsoft.com/office/drawing/2010/main" val="0"/>
-              </a:ext>
-            </a:extLst>
-          </a:blip>
-          <a:srcRect l="2952" t="6356" b="11739"/>
-          <a:stretch/>
-        </p:blipFill>
-        <p:spPr>
-          <a:xfrm>
-            <a:off x="0" y="0"/>
-            <a:ext cx="9144001" cy="5143500"/>
-          </a:xfrm>
-          <a:prstGeom prst="rect">
-            <a:avLst/>
-          </a:prstGeom>
-        </p:spPr>
-      </p:pic>
-      <p:sp>
-        <p:nvSpPr>
-          <p:cNvPr id="8" name="Rectangle 7"/>
-          <p:cNvSpPr/>
-          <p:nvPr/>
-        </p:nvSpPr>
-        <p:spPr>
-          <a:xfrm>
-            <a:off x="1" y="0"/>
-            <a:ext cx="9144000" cy="5143500"/>
-          </a:xfrm>
-          <a:prstGeom prst="rect">
-            <a:avLst/>
-          </a:prstGeom>
-          <a:solidFill>
-            <a:srgbClr val="1C3750">
-              <a:alpha val="58000"/>
-            </a:srgbClr>
-          </a:solidFill>
-          <a:ln>
-            <a:noFill/>
-          </a:ln>
-        </p:spPr>
-        <p:style>
-          <a:lnRef idx="1">
-            <a:schemeClr val="accent1"/>
-          </a:lnRef>
-          <a:fillRef idx="3">
-            <a:schemeClr val="accent1"/>
-          </a:fillRef>
-          <a:effectRef idx="2">
-            <a:schemeClr val="accent1"/>
-          </a:effectRef>
-          <a:fontRef idx="minor">
-            <a:schemeClr val="lt1"/>
-          </a:fontRef>
-        </p:style>
-        <p:txBody>
-          <a:bodyPr rtlCol="0" anchor="ctr"/>
-          <a:lstStyle/>
-          <a:p>
-            <a:pPr algn="ctr"/>
-            <a:endParaRPr lang="en-US" dirty="0">
-              <a:latin typeface="Arial Narrow"/>
-            </a:endParaRPr>
-          </a:p>
-        </p:txBody>
-      </p:sp>
-      <p:sp>
-        <p:nvSpPr>
-          <p:cNvPr id="2" name="Text Placeholder 1"/>
-          <p:cNvSpPr>
-            <a:spLocks noGrp="1"/>
-          </p:cNvSpPr>
-          <p:nvPr>
-            <p:ph type="body" sz="quarter" idx="4294967295"/>
-          </p:nvPr>
-        </p:nvSpPr>
-        <p:spPr>
-          <a:xfrm>
-            <a:off x="1359674" y="1195873"/>
-            <a:ext cx="7067150" cy="2762252"/>
-          </a:xfrm>
-        </p:spPr>
-        <p:txBody>
-          <a:bodyPr>
-            <a:noAutofit/>
-          </a:bodyPr>
-          <a:lstStyle/>
-          <a:p>
-            <a:pPr marL="0" indent="0">
-              <a:buNone/>
-            </a:pPr>
-            <a:r>
-              <a:rPr lang="en-US" sz="5400" dirty="0">
-                <a:solidFill>
-                  <a:srgbClr val="FFFFFF"/>
-                </a:solidFill>
-                <a:latin typeface="Cambria"/>
-                <a:cs typeface="Cambria"/>
-              </a:rPr>
-              <a:t>Add a High-Level Impact Statement Here</a:t>
-            </a:r>
-          </a:p>
-        </p:txBody>
-      </p:sp>
-      <p:sp>
-        <p:nvSpPr>
-          <p:cNvPr id="5" name="Right Triangle 4"/>
-          <p:cNvSpPr/>
-          <p:nvPr/>
-        </p:nvSpPr>
-        <p:spPr>
-          <a:xfrm rot="10800000">
-            <a:off x="903599" y="1207968"/>
-            <a:ext cx="447525" cy="338667"/>
-          </a:xfrm>
-          <a:prstGeom prst="rtTriangle">
-            <a:avLst/>
-          </a:prstGeom>
-          <a:solidFill>
-            <a:srgbClr val="76201E"/>
-          </a:solidFill>
-          <a:ln>
-            <a:noFill/>
-          </a:ln>
-        </p:spPr>
-        <p:style>
-          <a:lnRef idx="1">
-            <a:schemeClr val="accent1"/>
-          </a:lnRef>
-          <a:fillRef idx="3">
-            <a:schemeClr val="accent1"/>
-          </a:fillRef>
-          <a:effectRef idx="2">
-            <a:schemeClr val="accent1"/>
-          </a:effectRef>
-          <a:fontRef idx="minor">
-            <a:schemeClr val="lt1"/>
-          </a:fontRef>
-        </p:style>
-        <p:txBody>
-          <a:bodyPr rtlCol="0" anchor="ctr"/>
-          <a:lstStyle/>
-          <a:p>
-            <a:pPr algn="ctr"/>
-            <a:endParaRPr lang="en-US" dirty="0">
-              <a:latin typeface="Arial Narrow"/>
-            </a:endParaRPr>
-          </a:p>
-        </p:txBody>
-      </p:sp>
-      <p:sp>
-        <p:nvSpPr>
-          <p:cNvPr id="6" name="Rectangle 5"/>
-          <p:cNvSpPr/>
-          <p:nvPr/>
-        </p:nvSpPr>
-        <p:spPr>
-          <a:xfrm>
-            <a:off x="903600" y="635374"/>
-            <a:ext cx="2044096" cy="572594"/>
-          </a:xfrm>
-          <a:prstGeom prst="rect">
-            <a:avLst/>
-          </a:prstGeom>
-          <a:solidFill>
-            <a:srgbClr val="9C2A27"/>
-          </a:solidFill>
-          <a:ln>
-            <a:noFill/>
-          </a:ln>
-        </p:spPr>
-        <p:style>
-          <a:lnRef idx="1">
-            <a:schemeClr val="accent1"/>
-          </a:lnRef>
-          <a:fillRef idx="3">
-            <a:schemeClr val="accent1"/>
-          </a:fillRef>
-          <a:effectRef idx="2">
-            <a:schemeClr val="accent1"/>
-          </a:effectRef>
-          <a:fontRef idx="minor">
-            <a:schemeClr val="lt1"/>
-          </a:fontRef>
-        </p:style>
-        <p:txBody>
-          <a:bodyPr rtlCol="0" anchor="ctr"/>
-          <a:lstStyle/>
-          <a:p>
-            <a:pPr algn="ctr"/>
-            <a:endParaRPr lang="en-US" dirty="0">
-              <a:latin typeface="Arial Narrow"/>
-            </a:endParaRPr>
-          </a:p>
-        </p:txBody>
-      </p:sp>
-      <p:sp>
-        <p:nvSpPr>
-          <p:cNvPr id="9" name="Text Placeholder 2"/>
+          </p:cNvPr>
           <p:cNvSpPr txBox="1">
             <a:spLocks/>
           </p:cNvSpPr>
@@ -5589,8 +4866,8 @@
         </p:nvSpPr>
         <p:spPr>
           <a:xfrm>
-            <a:off x="1030909" y="679136"/>
-            <a:ext cx="2388190" cy="572594"/>
+            <a:off x="974248" y="11364"/>
+            <a:ext cx="4713288" cy="1395412"/>
           </a:xfrm>
           <a:prstGeom prst="rect">
             <a:avLst/>
@@ -5771,6 +5048,715 @@
             </a:lvl9pPr>
           </a:lstStyle>
           <a:p>
+            <a:r>
+              <a:rPr lang="en-US" dirty="0">
+                <a:solidFill>
+                  <a:schemeClr val="tx1"/>
+                </a:solidFill>
+              </a:rPr>
+              <a:t>How?</a:t>
+            </a:r>
+          </a:p>
+        </p:txBody>
+      </p:sp>
+      <p:grpSp>
+        <p:nvGrpSpPr>
+          <p:cNvPr id="14" name="Group 13">
+            <a:extLst>
+              <a:ext uri="{FF2B5EF4-FFF2-40B4-BE49-F238E27FC236}">
+                <a16:creationId xmlns:a16="http://schemas.microsoft.com/office/drawing/2014/main" id="{E7D69C1B-4066-49E6-BC59-E2D768E140A6}"/>
+              </a:ext>
+            </a:extLst>
+          </p:cNvPr>
+          <p:cNvGrpSpPr/>
+          <p:nvPr/>
+        </p:nvGrpSpPr>
+        <p:grpSpPr>
+          <a:xfrm>
+            <a:off x="750487" y="873538"/>
+            <a:ext cx="671896" cy="675145"/>
+            <a:chOff x="340088" y="1394937"/>
+            <a:chExt cx="671896" cy="911261"/>
+          </a:xfrm>
+        </p:grpSpPr>
+        <p:sp>
+          <p:nvSpPr>
+            <p:cNvPr id="15" name="Right Triangle 14">
+              <a:extLst>
+                <a:ext uri="{FF2B5EF4-FFF2-40B4-BE49-F238E27FC236}">
+                  <a16:creationId xmlns:a16="http://schemas.microsoft.com/office/drawing/2014/main" id="{BFB600FC-A887-4CD3-908C-4B0B47A5559F}"/>
+                </a:ext>
+              </a:extLst>
+            </p:cNvPr>
+            <p:cNvSpPr/>
+            <p:nvPr/>
+          </p:nvSpPr>
+          <p:spPr>
+            <a:xfrm rot="10800000">
+              <a:off x="340088" y="1967531"/>
+              <a:ext cx="447525" cy="338667"/>
+            </a:xfrm>
+            <a:prstGeom prst="rtTriangle">
+              <a:avLst/>
+            </a:prstGeom>
+            <a:solidFill>
+              <a:srgbClr val="76201E"/>
+            </a:solidFill>
+            <a:ln>
+              <a:noFill/>
+            </a:ln>
+          </p:spPr>
+          <p:style>
+            <a:lnRef idx="1">
+              <a:schemeClr val="accent1"/>
+            </a:lnRef>
+            <a:fillRef idx="3">
+              <a:schemeClr val="accent1"/>
+            </a:fillRef>
+            <a:effectRef idx="2">
+              <a:schemeClr val="accent1"/>
+            </a:effectRef>
+            <a:fontRef idx="minor">
+              <a:schemeClr val="lt1"/>
+            </a:fontRef>
+          </p:style>
+          <p:txBody>
+            <a:bodyPr rtlCol="0" anchor="ctr"/>
+            <a:lstStyle/>
+            <a:p>
+              <a:pPr algn="ctr"/>
+              <a:endParaRPr lang="en-US" dirty="0">
+                <a:latin typeface="Arial Narrow"/>
+              </a:endParaRPr>
+            </a:p>
+          </p:txBody>
+        </p:sp>
+        <p:sp>
+          <p:nvSpPr>
+            <p:cNvPr id="16" name="Rectangle 15">
+              <a:extLst>
+                <a:ext uri="{FF2B5EF4-FFF2-40B4-BE49-F238E27FC236}">
+                  <a16:creationId xmlns:a16="http://schemas.microsoft.com/office/drawing/2014/main" id="{15D92AB1-6254-4C8B-9C93-B0362876282A}"/>
+                </a:ext>
+              </a:extLst>
+            </p:cNvPr>
+            <p:cNvSpPr/>
+            <p:nvPr/>
+          </p:nvSpPr>
+          <p:spPr>
+            <a:xfrm>
+              <a:off x="340089" y="1394937"/>
+              <a:ext cx="671895" cy="572594"/>
+            </a:xfrm>
+            <a:prstGeom prst="rect">
+              <a:avLst/>
+            </a:prstGeom>
+            <a:solidFill>
+              <a:srgbClr val="9C2A27"/>
+            </a:solidFill>
+            <a:ln>
+              <a:noFill/>
+            </a:ln>
+          </p:spPr>
+          <p:style>
+            <a:lnRef idx="1">
+              <a:schemeClr val="accent1"/>
+            </a:lnRef>
+            <a:fillRef idx="3">
+              <a:schemeClr val="accent1"/>
+            </a:fillRef>
+            <a:effectRef idx="2">
+              <a:schemeClr val="accent1"/>
+            </a:effectRef>
+            <a:fontRef idx="minor">
+              <a:schemeClr val="lt1"/>
+            </a:fontRef>
+          </p:style>
+          <p:txBody>
+            <a:bodyPr rtlCol="0" anchor="ctr"/>
+            <a:lstStyle/>
+            <a:p>
+              <a:pPr algn="ctr"/>
+              <a:endParaRPr lang="en-US" dirty="0">
+                <a:latin typeface="Arial Narrow"/>
+              </a:endParaRPr>
+            </a:p>
+          </p:txBody>
+        </p:sp>
+      </p:grpSp>
+      <p:sp>
+        <p:nvSpPr>
+          <p:cNvPr id="2" name="TextBox 1">
+            <a:extLst>
+              <a:ext uri="{FF2B5EF4-FFF2-40B4-BE49-F238E27FC236}">
+                <a16:creationId xmlns:a16="http://schemas.microsoft.com/office/drawing/2014/main" id="{CBFC83B3-7648-475C-A613-F234FA8219D0}"/>
+              </a:ext>
+            </a:extLst>
+          </p:cNvPr>
+          <p:cNvSpPr txBox="1"/>
+          <p:nvPr/>
+        </p:nvSpPr>
+        <p:spPr>
+          <a:xfrm>
+            <a:off x="750489" y="873538"/>
+            <a:ext cx="671895" cy="523220"/>
+          </a:xfrm>
+          <a:prstGeom prst="rect">
+            <a:avLst/>
+          </a:prstGeom>
+          <a:noFill/>
+        </p:spPr>
+        <p:txBody>
+          <a:bodyPr wrap="square" rtlCol="0">
+            <a:spAutoFit/>
+          </a:bodyPr>
+          <a:lstStyle/>
+          <a:p>
+            <a:r>
+              <a:rPr lang="en-US" sz="2800" dirty="0">
+                <a:solidFill>
+                  <a:schemeClr val="bg1"/>
+                </a:solidFill>
+              </a:rPr>
+              <a:t>   1</a:t>
+            </a:r>
+          </a:p>
+        </p:txBody>
+      </p:sp>
+    </p:spTree>
+    <p:extLst>
+      <p:ext uri="{BB962C8B-B14F-4D97-AF65-F5344CB8AC3E}">
+        <p14:creationId xmlns:p14="http://schemas.microsoft.com/office/powerpoint/2010/main" val="3271580096"/>
+      </p:ext>
+    </p:extLst>
+  </p:cSld>
+  <p:clrMapOvr>
+    <a:masterClrMapping/>
+  </p:clrMapOvr>
+</p:sld>
+</file>
+
+<file path=ppt/slides/slide11.xml><?xml version="1.0" encoding="utf-8"?>
+<p:sld xmlns:a="http://schemas.openxmlformats.org/drawingml/2006/main" xmlns:r="http://schemas.openxmlformats.org/officeDocument/2006/relationships" xmlns:p="http://schemas.openxmlformats.org/presentationml/2006/main">
+  <p:cSld>
+    <p:spTree>
+      <p:nvGrpSpPr>
+        <p:cNvPr id="1" name=""/>
+        <p:cNvGrpSpPr/>
+        <p:nvPr/>
+      </p:nvGrpSpPr>
+      <p:grpSpPr>
+        <a:xfrm>
+          <a:off x="0" y="0"/>
+          <a:ext cx="0" cy="0"/>
+          <a:chOff x="0" y="0"/>
+          <a:chExt cx="0" cy="0"/>
+        </a:xfrm>
+      </p:grpSpPr>
+      <p:sp>
+        <p:nvSpPr>
+          <p:cNvPr id="2" name="Text Placeholder 1"/>
+          <p:cNvSpPr>
+            <a:spLocks noGrp="1"/>
+          </p:cNvSpPr>
+          <p:nvPr>
+            <p:ph type="body" sz="quarter" idx="10"/>
+          </p:nvPr>
+        </p:nvSpPr>
+        <p:spPr>
+          <a:xfrm>
+            <a:off x="1004888" y="1598706"/>
+            <a:ext cx="7083425" cy="1897529"/>
+          </a:xfrm>
+        </p:spPr>
+        <p:txBody>
+          <a:bodyPr>
+            <a:normAutofit/>
+          </a:bodyPr>
+          <a:lstStyle/>
+          <a:p>
+            <a:r>
+              <a:rPr lang="en-US" sz="3600" dirty="0"/>
+              <a:t>Add Text, an Image, or Both</a:t>
+            </a:r>
+          </a:p>
+        </p:txBody>
+      </p:sp>
+      <p:pic>
+        <p:nvPicPr>
+          <p:cNvPr id="3" name="Picture 2">
+            <a:extLst>
+              <a:ext uri="{FF2B5EF4-FFF2-40B4-BE49-F238E27FC236}">
+                <a16:creationId xmlns:a16="http://schemas.microsoft.com/office/drawing/2014/main" id="{FD3400B4-6AD4-41AB-9869-02C8AB84245D}"/>
+              </a:ext>
+            </a:extLst>
+          </p:cNvPr>
+          <p:cNvPicPr/>
+          <p:nvPr/>
+        </p:nvPicPr>
+        <p:blipFill>
+          <a:blip r:embed="rId2">
+            <a:extLst>
+              <a:ext uri="{28A0092B-C50C-407E-A947-70E740481C1C}">
+                <a14:useLocalDpi xmlns:a14="http://schemas.microsoft.com/office/drawing/2010/main" val="0"/>
+              </a:ext>
+            </a:extLst>
+          </a:blip>
+          <a:srcRect/>
+          <a:stretch>
+            <a:fillRect/>
+          </a:stretch>
+        </p:blipFill>
+        <p:spPr bwMode="auto">
+          <a:xfrm>
+            <a:off x="0" y="0"/>
+            <a:ext cx="9144000" cy="5143499"/>
+          </a:xfrm>
+          <a:prstGeom prst="rect">
+            <a:avLst/>
+          </a:prstGeom>
+          <a:blipFill dpi="0" rotWithShape="1">
+            <a:blip r:embed="rId3">
+              <a:alphaModFix amt="39000"/>
+            </a:blip>
+            <a:srcRect/>
+            <a:tile tx="0" ty="0" sx="100000" sy="100000" flip="none" algn="tl"/>
+          </a:blipFill>
+          <a:ln>
+            <a:noFill/>
+          </a:ln>
+        </p:spPr>
+      </p:pic>
+    </p:spTree>
+    <p:extLst>
+      <p:ext uri="{BB962C8B-B14F-4D97-AF65-F5344CB8AC3E}">
+        <p14:creationId xmlns:p14="http://schemas.microsoft.com/office/powerpoint/2010/main" val="916899699"/>
+      </p:ext>
+    </p:extLst>
+  </p:cSld>
+  <p:clrMapOvr>
+    <a:masterClrMapping/>
+  </p:clrMapOvr>
+</p:sld>
+</file>
+
+<file path=ppt/slides/slide12.xml><?xml version="1.0" encoding="utf-8"?>
+<p:sld xmlns:a="http://schemas.openxmlformats.org/drawingml/2006/main" xmlns:r="http://schemas.openxmlformats.org/officeDocument/2006/relationships" xmlns:p="http://schemas.openxmlformats.org/presentationml/2006/main">
+  <p:cSld>
+    <p:spTree>
+      <p:nvGrpSpPr>
+        <p:cNvPr id="1" name=""/>
+        <p:cNvGrpSpPr/>
+        <p:nvPr/>
+      </p:nvGrpSpPr>
+      <p:grpSpPr>
+        <a:xfrm>
+          <a:off x="0" y="0"/>
+          <a:ext cx="0" cy="0"/>
+          <a:chOff x="0" y="0"/>
+          <a:chExt cx="0" cy="0"/>
+        </a:xfrm>
+      </p:grpSpPr>
+      <p:pic>
+        <p:nvPicPr>
+          <p:cNvPr id="4" name="Picture 3" descr="7K0A0619.JPG"/>
+          <p:cNvPicPr>
+            <a:picLocks noChangeAspect="1"/>
+          </p:cNvPicPr>
+          <p:nvPr/>
+        </p:nvPicPr>
+        <p:blipFill rotWithShape="1">
+          <a:blip r:embed="rId2">
+            <a:alphaModFix amt="94000"/>
+            <a:extLst>
+              <a:ext uri="{28A0092B-C50C-407E-A947-70E740481C1C}">
+                <a14:useLocalDpi xmlns:a14="http://schemas.microsoft.com/office/drawing/2010/main" val="0"/>
+              </a:ext>
+            </a:extLst>
+          </a:blip>
+          <a:srcRect l="2952" t="6356" b="11739"/>
+          <a:stretch/>
+        </p:blipFill>
+        <p:spPr>
+          <a:xfrm>
+            <a:off x="0" y="0"/>
+            <a:ext cx="9144001" cy="5143500"/>
+          </a:xfrm>
+          <a:prstGeom prst="rect">
+            <a:avLst/>
+          </a:prstGeom>
+        </p:spPr>
+      </p:pic>
+      <p:sp>
+        <p:nvSpPr>
+          <p:cNvPr id="8" name="Rectangle 7"/>
+          <p:cNvSpPr/>
+          <p:nvPr/>
+        </p:nvSpPr>
+        <p:spPr>
+          <a:xfrm>
+            <a:off x="1" y="0"/>
+            <a:ext cx="9144000" cy="5143500"/>
+          </a:xfrm>
+          <a:prstGeom prst="rect">
+            <a:avLst/>
+          </a:prstGeom>
+          <a:solidFill>
+            <a:srgbClr val="1C3750">
+              <a:alpha val="58000"/>
+            </a:srgbClr>
+          </a:solidFill>
+          <a:ln>
+            <a:noFill/>
+          </a:ln>
+        </p:spPr>
+        <p:style>
+          <a:lnRef idx="1">
+            <a:schemeClr val="accent1"/>
+          </a:lnRef>
+          <a:fillRef idx="3">
+            <a:schemeClr val="accent1"/>
+          </a:fillRef>
+          <a:effectRef idx="2">
+            <a:schemeClr val="accent1"/>
+          </a:effectRef>
+          <a:fontRef idx="minor">
+            <a:schemeClr val="lt1"/>
+          </a:fontRef>
+        </p:style>
+        <p:txBody>
+          <a:bodyPr rtlCol="0" anchor="ctr"/>
+          <a:lstStyle/>
+          <a:p>
+            <a:pPr algn="ctr"/>
+            <a:endParaRPr lang="en-US" dirty="0">
+              <a:latin typeface="Arial Narrow"/>
+            </a:endParaRPr>
+          </a:p>
+        </p:txBody>
+      </p:sp>
+      <p:sp>
+        <p:nvSpPr>
+          <p:cNvPr id="2" name="Text Placeholder 1"/>
+          <p:cNvSpPr>
+            <a:spLocks noGrp="1"/>
+          </p:cNvSpPr>
+          <p:nvPr>
+            <p:ph type="body" sz="quarter" idx="4294967295"/>
+          </p:nvPr>
+        </p:nvSpPr>
+        <p:spPr>
+          <a:xfrm>
+            <a:off x="1359674" y="1195873"/>
+            <a:ext cx="7067150" cy="2762252"/>
+          </a:xfrm>
+        </p:spPr>
+        <p:txBody>
+          <a:bodyPr>
+            <a:noAutofit/>
+          </a:bodyPr>
+          <a:lstStyle/>
+          <a:p>
+            <a:pPr marL="0" indent="0">
+              <a:buNone/>
+            </a:pPr>
+            <a:r>
+              <a:rPr lang="en-US" sz="5400" dirty="0">
+                <a:solidFill>
+                  <a:srgbClr val="FFFFFF"/>
+                </a:solidFill>
+                <a:latin typeface="Cambria"/>
+                <a:cs typeface="Cambria"/>
+              </a:rPr>
+              <a:t>Add a High-Level Impact Statement Here</a:t>
+            </a:r>
+          </a:p>
+        </p:txBody>
+      </p:sp>
+      <p:sp>
+        <p:nvSpPr>
+          <p:cNvPr id="5" name="Right Triangle 4"/>
+          <p:cNvSpPr/>
+          <p:nvPr/>
+        </p:nvSpPr>
+        <p:spPr>
+          <a:xfrm rot="10800000">
+            <a:off x="903599" y="1207968"/>
+            <a:ext cx="447525" cy="338667"/>
+          </a:xfrm>
+          <a:prstGeom prst="rtTriangle">
+            <a:avLst/>
+          </a:prstGeom>
+          <a:solidFill>
+            <a:srgbClr val="76201E"/>
+          </a:solidFill>
+          <a:ln>
+            <a:noFill/>
+          </a:ln>
+        </p:spPr>
+        <p:style>
+          <a:lnRef idx="1">
+            <a:schemeClr val="accent1"/>
+          </a:lnRef>
+          <a:fillRef idx="3">
+            <a:schemeClr val="accent1"/>
+          </a:fillRef>
+          <a:effectRef idx="2">
+            <a:schemeClr val="accent1"/>
+          </a:effectRef>
+          <a:fontRef idx="minor">
+            <a:schemeClr val="lt1"/>
+          </a:fontRef>
+        </p:style>
+        <p:txBody>
+          <a:bodyPr rtlCol="0" anchor="ctr"/>
+          <a:lstStyle/>
+          <a:p>
+            <a:pPr algn="ctr"/>
+            <a:endParaRPr lang="en-US" dirty="0">
+              <a:latin typeface="Arial Narrow"/>
+            </a:endParaRPr>
+          </a:p>
+        </p:txBody>
+      </p:sp>
+      <p:sp>
+        <p:nvSpPr>
+          <p:cNvPr id="6" name="Rectangle 5"/>
+          <p:cNvSpPr/>
+          <p:nvPr/>
+        </p:nvSpPr>
+        <p:spPr>
+          <a:xfrm>
+            <a:off x="903600" y="635374"/>
+            <a:ext cx="2044096" cy="572594"/>
+          </a:xfrm>
+          <a:prstGeom prst="rect">
+            <a:avLst/>
+          </a:prstGeom>
+          <a:solidFill>
+            <a:srgbClr val="9C2A27"/>
+          </a:solidFill>
+          <a:ln>
+            <a:noFill/>
+          </a:ln>
+        </p:spPr>
+        <p:style>
+          <a:lnRef idx="1">
+            <a:schemeClr val="accent1"/>
+          </a:lnRef>
+          <a:fillRef idx="3">
+            <a:schemeClr val="accent1"/>
+          </a:fillRef>
+          <a:effectRef idx="2">
+            <a:schemeClr val="accent1"/>
+          </a:effectRef>
+          <a:fontRef idx="minor">
+            <a:schemeClr val="lt1"/>
+          </a:fontRef>
+        </p:style>
+        <p:txBody>
+          <a:bodyPr rtlCol="0" anchor="ctr"/>
+          <a:lstStyle/>
+          <a:p>
+            <a:pPr algn="ctr"/>
+            <a:endParaRPr lang="en-US" dirty="0">
+              <a:latin typeface="Arial Narrow"/>
+            </a:endParaRPr>
+          </a:p>
+        </p:txBody>
+      </p:sp>
+      <p:sp>
+        <p:nvSpPr>
+          <p:cNvPr id="9" name="Text Placeholder 2"/>
+          <p:cNvSpPr txBox="1">
+            <a:spLocks/>
+          </p:cNvSpPr>
+          <p:nvPr/>
+        </p:nvSpPr>
+        <p:spPr>
+          <a:xfrm>
+            <a:off x="1030909" y="679136"/>
+            <a:ext cx="2388190" cy="572594"/>
+          </a:xfrm>
+          <a:prstGeom prst="rect">
+            <a:avLst/>
+          </a:prstGeom>
+        </p:spPr>
+        <p:txBody>
+          <a:bodyPr/>
+          <a:lstStyle>
+            <a:lvl1pPr marL="342900" indent="-342900" algn="l" defTabSz="457200" rtl="0" eaLnBrk="1" latinLnBrk="0" hangingPunct="1">
+              <a:spcBef>
+                <a:spcPct val="20000"/>
+              </a:spcBef>
+              <a:buClr>
+                <a:schemeClr val="accent2">
+                  <a:lumMod val="75000"/>
+                </a:schemeClr>
+              </a:buClr>
+              <a:buFont typeface="Arial"/>
+              <a:buChar char="•"/>
+              <a:defRPr sz="3200" b="0" i="0" kern="1200">
+                <a:solidFill>
+                  <a:schemeClr val="tx1">
+                    <a:lumMod val="50000"/>
+                  </a:schemeClr>
+                </a:solidFill>
+                <a:latin typeface="Helvetica Light"/>
+                <a:ea typeface="+mn-ea"/>
+                <a:cs typeface="Helvetica Light"/>
+              </a:defRPr>
+            </a:lvl1pPr>
+            <a:lvl2pPr marL="742950" indent="-285750" algn="l" defTabSz="457200" rtl="0" eaLnBrk="1" latinLnBrk="0" hangingPunct="1">
+              <a:spcBef>
+                <a:spcPct val="20000"/>
+              </a:spcBef>
+              <a:buClr>
+                <a:schemeClr val="accent2">
+                  <a:lumMod val="75000"/>
+                </a:schemeClr>
+              </a:buClr>
+              <a:buFont typeface="Arial" panose="020B0604020202020204" pitchFamily="34" charset="0"/>
+              <a:buChar char="•"/>
+              <a:defRPr sz="2400" b="0" i="0" kern="1200">
+                <a:solidFill>
+                  <a:schemeClr val="tx1">
+                    <a:lumMod val="50000"/>
+                  </a:schemeClr>
+                </a:solidFill>
+                <a:latin typeface="Helvetica Light"/>
+                <a:ea typeface="+mn-ea"/>
+                <a:cs typeface="Helvetica Light"/>
+              </a:defRPr>
+            </a:lvl2pPr>
+            <a:lvl3pPr marL="1143000" indent="-228600" algn="l" defTabSz="457200" rtl="0" eaLnBrk="1" latinLnBrk="0" hangingPunct="1">
+              <a:spcBef>
+                <a:spcPct val="20000"/>
+              </a:spcBef>
+              <a:buClr>
+                <a:schemeClr val="accent2">
+                  <a:lumMod val="75000"/>
+                </a:schemeClr>
+              </a:buClr>
+              <a:buFont typeface="Arial"/>
+              <a:buChar char="•"/>
+              <a:defRPr sz="2400" b="0" i="0" kern="1200">
+                <a:solidFill>
+                  <a:schemeClr val="tx1">
+                    <a:lumMod val="50000"/>
+                  </a:schemeClr>
+                </a:solidFill>
+                <a:latin typeface="Helvetica Light"/>
+                <a:ea typeface="+mn-ea"/>
+                <a:cs typeface="Helvetica Light"/>
+              </a:defRPr>
+            </a:lvl3pPr>
+            <a:lvl4pPr marL="1600200" indent="-228600" algn="l" defTabSz="457200" rtl="0" eaLnBrk="1" latinLnBrk="0" hangingPunct="1">
+              <a:spcBef>
+                <a:spcPct val="20000"/>
+              </a:spcBef>
+              <a:buClr>
+                <a:schemeClr val="accent2">
+                  <a:lumMod val="75000"/>
+                </a:schemeClr>
+              </a:buClr>
+              <a:buFont typeface="Arial" panose="020B0604020202020204" pitchFamily="34" charset="0"/>
+              <a:buChar char="•"/>
+              <a:defRPr sz="2000" b="0" i="0" kern="1200">
+                <a:solidFill>
+                  <a:schemeClr val="tx1">
+                    <a:lumMod val="50000"/>
+                  </a:schemeClr>
+                </a:solidFill>
+                <a:latin typeface="Helvetica Light"/>
+                <a:ea typeface="+mn-ea"/>
+                <a:cs typeface="Helvetica Light"/>
+              </a:defRPr>
+            </a:lvl4pPr>
+            <a:lvl5pPr marL="2057400" indent="-228600" algn="l" defTabSz="457200" rtl="0" eaLnBrk="1" latinLnBrk="0" hangingPunct="1">
+              <a:spcBef>
+                <a:spcPct val="20000"/>
+              </a:spcBef>
+              <a:buClr>
+                <a:schemeClr val="accent2">
+                  <a:lumMod val="75000"/>
+                </a:schemeClr>
+              </a:buClr>
+              <a:buFont typeface="Arial" panose="020B0604020202020204" pitchFamily="34" charset="0"/>
+              <a:buChar char="•"/>
+              <a:defRPr sz="2000" b="0" i="0" kern="1200">
+                <a:solidFill>
+                  <a:schemeClr val="tx1">
+                    <a:lumMod val="50000"/>
+                  </a:schemeClr>
+                </a:solidFill>
+                <a:latin typeface="Helvetica Light"/>
+                <a:ea typeface="+mn-ea"/>
+                <a:cs typeface="Helvetica Light"/>
+              </a:defRPr>
+            </a:lvl5pPr>
+            <a:lvl6pPr marL="2514600" indent="-228600" algn="l" defTabSz="457200" rtl="0" eaLnBrk="1" latinLnBrk="0" hangingPunct="1">
+              <a:spcBef>
+                <a:spcPct val="20000"/>
+              </a:spcBef>
+              <a:buFont typeface="Arial"/>
+              <a:buChar char="•"/>
+              <a:defRPr sz="2000" kern="1200">
+                <a:solidFill>
+                  <a:schemeClr val="tx1"/>
+                </a:solidFill>
+                <a:latin typeface="+mn-lt"/>
+                <a:ea typeface="+mn-ea"/>
+                <a:cs typeface="+mn-cs"/>
+              </a:defRPr>
+            </a:lvl6pPr>
+            <a:lvl7pPr marL="2971800" indent="-228600" algn="l" defTabSz="457200" rtl="0" eaLnBrk="1" latinLnBrk="0" hangingPunct="1">
+              <a:spcBef>
+                <a:spcPct val="20000"/>
+              </a:spcBef>
+              <a:buFont typeface="Arial"/>
+              <a:buChar char="•"/>
+              <a:defRPr sz="2000" kern="1200">
+                <a:solidFill>
+                  <a:schemeClr val="tx1"/>
+                </a:solidFill>
+                <a:latin typeface="+mn-lt"/>
+                <a:ea typeface="+mn-ea"/>
+                <a:cs typeface="+mn-cs"/>
+              </a:defRPr>
+            </a:lvl7pPr>
+            <a:lvl8pPr marL="3429000" indent="-228600" algn="l" defTabSz="457200" rtl="0" eaLnBrk="1" latinLnBrk="0" hangingPunct="1">
+              <a:spcBef>
+                <a:spcPct val="20000"/>
+              </a:spcBef>
+              <a:buFont typeface="Arial"/>
+              <a:buChar char="•"/>
+              <a:defRPr sz="2000" kern="1200">
+                <a:solidFill>
+                  <a:schemeClr val="tx1"/>
+                </a:solidFill>
+                <a:latin typeface="+mn-lt"/>
+                <a:ea typeface="+mn-ea"/>
+                <a:cs typeface="+mn-cs"/>
+              </a:defRPr>
+            </a:lvl8pPr>
+            <a:lvl9pPr marL="3886200" indent="-228600" algn="l" defTabSz="457200" rtl="0" eaLnBrk="1" latinLnBrk="0" hangingPunct="1">
+              <a:spcBef>
+                <a:spcPct val="20000"/>
+              </a:spcBef>
+              <a:buFont typeface="Arial"/>
+              <a:buChar char="•"/>
+              <a:defRPr sz="2000" kern="1200">
+                <a:solidFill>
+                  <a:schemeClr val="tx1"/>
+                </a:solidFill>
+                <a:latin typeface="+mn-lt"/>
+                <a:ea typeface="+mn-ea"/>
+                <a:cs typeface="+mn-cs"/>
+              </a:defRPr>
+            </a:lvl9pPr>
+          </a:lstStyle>
+          <a:p>
             <a:pPr marL="0" indent="0">
               <a:buNone/>
             </a:pPr>
@@ -5791,6 +5777,1796 @@
     <p:extLst>
       <p:ext uri="{BB962C8B-B14F-4D97-AF65-F5344CB8AC3E}">
         <p14:creationId xmlns:p14="http://schemas.microsoft.com/office/powerpoint/2010/main" val="437039837"/>
+      </p:ext>
+    </p:extLst>
+  </p:cSld>
+  <p:clrMapOvr>
+    <a:masterClrMapping/>
+  </p:clrMapOvr>
+</p:sld>
+</file>
+
+<file path=ppt/slides/slide13.xml><?xml version="1.0" encoding="utf-8"?>
+<p:sld xmlns:a="http://schemas.openxmlformats.org/drawingml/2006/main" xmlns:r="http://schemas.openxmlformats.org/officeDocument/2006/relationships" xmlns:p="http://schemas.openxmlformats.org/presentationml/2006/main">
+  <p:cSld>
+    <p:spTree>
+      <p:nvGrpSpPr>
+        <p:cNvPr id="1" name=""/>
+        <p:cNvGrpSpPr/>
+        <p:nvPr/>
+      </p:nvGrpSpPr>
+      <p:grpSpPr>
+        <a:xfrm>
+          <a:off x="0" y="0"/>
+          <a:ext cx="0" cy="0"/>
+          <a:chOff x="0" y="0"/>
+          <a:chExt cx="0" cy="0"/>
+        </a:xfrm>
+      </p:grpSpPr>
+      <p:sp>
+        <p:nvSpPr>
+          <p:cNvPr id="2" name="Text Placeholder 1"/>
+          <p:cNvSpPr>
+            <a:spLocks noGrp="1"/>
+          </p:cNvSpPr>
+          <p:nvPr>
+            <p:ph type="body" sz="quarter" idx="10"/>
+          </p:nvPr>
+        </p:nvSpPr>
+        <p:spPr>
+          <a:xfrm>
+            <a:off x="134470" y="393047"/>
+            <a:ext cx="2091766" cy="481640"/>
+          </a:xfrm>
+        </p:spPr>
+        <p:txBody>
+          <a:bodyPr/>
+          <a:lstStyle/>
+          <a:p>
+            <a:pPr algn="ctr"/>
+            <a:r>
+              <a:rPr lang="en-US" dirty="0"/>
+              <a:t>Data Point</a:t>
+            </a:r>
+          </a:p>
+        </p:txBody>
+      </p:sp>
+      <p:sp>
+        <p:nvSpPr>
+          <p:cNvPr id="3" name="Text Placeholder 2"/>
+          <p:cNvSpPr>
+            <a:spLocks noGrp="1"/>
+          </p:cNvSpPr>
+          <p:nvPr>
+            <p:ph type="body" sz="quarter" idx="11"/>
+          </p:nvPr>
+        </p:nvSpPr>
+        <p:spPr/>
+        <p:txBody>
+          <a:bodyPr/>
+          <a:lstStyle/>
+          <a:p>
+            <a:r>
+              <a:rPr lang="en-US" dirty="0"/>
+              <a:t>Describe Data Point</a:t>
+            </a:r>
+          </a:p>
+        </p:txBody>
+      </p:sp>
+      <p:sp>
+        <p:nvSpPr>
+          <p:cNvPr id="4" name="TextBox 3"/>
+          <p:cNvSpPr txBox="1"/>
+          <p:nvPr/>
+        </p:nvSpPr>
+        <p:spPr>
+          <a:xfrm>
+            <a:off x="556679" y="1509765"/>
+            <a:ext cx="3193555" cy="2646878"/>
+          </a:xfrm>
+          <a:prstGeom prst="rect">
+            <a:avLst/>
+          </a:prstGeom>
+          <a:noFill/>
+        </p:spPr>
+        <p:txBody>
+          <a:bodyPr wrap="square" rtlCol="0">
+            <a:spAutoFit/>
+          </a:bodyPr>
+          <a:lstStyle/>
+          <a:p>
+            <a:pPr algn="ctr"/>
+            <a:r>
+              <a:rPr lang="en-US" sz="16600" b="1" dirty="0">
+                <a:latin typeface="Arial"/>
+                <a:cs typeface="Arial"/>
+              </a:rPr>
+              <a:t>4x</a:t>
+            </a:r>
+          </a:p>
+        </p:txBody>
+      </p:sp>
+    </p:spTree>
+    <p:extLst>
+      <p:ext uri="{BB962C8B-B14F-4D97-AF65-F5344CB8AC3E}">
+        <p14:creationId xmlns:p14="http://schemas.microsoft.com/office/powerpoint/2010/main" val="1175957282"/>
+      </p:ext>
+    </p:extLst>
+  </p:cSld>
+  <p:clrMapOvr>
+    <a:masterClrMapping/>
+  </p:clrMapOvr>
+</p:sld>
+</file>
+
+<file path=ppt/slides/slide14.xml><?xml version="1.0" encoding="utf-8"?>
+<p:sld xmlns:a="http://schemas.openxmlformats.org/drawingml/2006/main" xmlns:r="http://schemas.openxmlformats.org/officeDocument/2006/relationships" xmlns:p="http://schemas.openxmlformats.org/presentationml/2006/main">
+  <p:cSld>
+    <p:spTree>
+      <p:nvGrpSpPr>
+        <p:cNvPr id="1" name=""/>
+        <p:cNvGrpSpPr/>
+        <p:nvPr/>
+      </p:nvGrpSpPr>
+      <p:grpSpPr>
+        <a:xfrm>
+          <a:off x="0" y="0"/>
+          <a:ext cx="0" cy="0"/>
+          <a:chOff x="0" y="0"/>
+          <a:chExt cx="0" cy="0"/>
+        </a:xfrm>
+      </p:grpSpPr>
+      <p:sp>
+        <p:nvSpPr>
+          <p:cNvPr id="2" name="Text Placeholder 1"/>
+          <p:cNvSpPr>
+            <a:spLocks noGrp="1"/>
+          </p:cNvSpPr>
+          <p:nvPr>
+            <p:ph type="body" sz="quarter" idx="10"/>
+          </p:nvPr>
+        </p:nvSpPr>
+        <p:spPr/>
+        <p:txBody>
+          <a:bodyPr/>
+          <a:lstStyle/>
+          <a:p>
+            <a:r>
+              <a:rPr lang="en-US" dirty="0"/>
+              <a:t>THANK YOU!</a:t>
+            </a:r>
+          </a:p>
+        </p:txBody>
+      </p:sp>
+    </p:spTree>
+    <p:extLst>
+      <p:ext uri="{BB962C8B-B14F-4D97-AF65-F5344CB8AC3E}">
+        <p14:creationId xmlns:p14="http://schemas.microsoft.com/office/powerpoint/2010/main" val="80668502"/>
+      </p:ext>
+    </p:extLst>
+  </p:cSld>
+  <p:clrMapOvr>
+    <a:masterClrMapping/>
+  </p:clrMapOvr>
+</p:sld>
+</file>
+
+<file path=ppt/slides/slide2.xml><?xml version="1.0" encoding="utf-8"?>
+<p:sld xmlns:a="http://schemas.openxmlformats.org/drawingml/2006/main" xmlns:r="http://schemas.openxmlformats.org/officeDocument/2006/relationships" xmlns:p="http://schemas.openxmlformats.org/presentationml/2006/main">
+  <p:cSld>
+    <p:spTree>
+      <p:nvGrpSpPr>
+        <p:cNvPr id="1" name=""/>
+        <p:cNvGrpSpPr/>
+        <p:nvPr/>
+      </p:nvGrpSpPr>
+      <p:grpSpPr>
+        <a:xfrm>
+          <a:off x="0" y="0"/>
+          <a:ext cx="0" cy="0"/>
+          <a:chOff x="0" y="0"/>
+          <a:chExt cx="0" cy="0"/>
+        </a:xfrm>
+      </p:grpSpPr>
+      <p:grpSp>
+        <p:nvGrpSpPr>
+          <p:cNvPr id="4" name="Group 3"/>
+          <p:cNvGrpSpPr/>
+          <p:nvPr/>
+        </p:nvGrpSpPr>
+        <p:grpSpPr>
+          <a:xfrm>
+            <a:off x="750486" y="3767772"/>
+            <a:ext cx="671896" cy="675145"/>
+            <a:chOff x="340088" y="1394937"/>
+            <a:chExt cx="671896" cy="911261"/>
+          </a:xfrm>
+        </p:grpSpPr>
+        <p:sp>
+          <p:nvSpPr>
+            <p:cNvPr id="5" name="Right Triangle 4"/>
+            <p:cNvSpPr/>
+            <p:nvPr/>
+          </p:nvSpPr>
+          <p:spPr>
+            <a:xfrm rot="10800000">
+              <a:off x="340088" y="1967531"/>
+              <a:ext cx="447525" cy="338667"/>
+            </a:xfrm>
+            <a:prstGeom prst="rtTriangle">
+              <a:avLst/>
+            </a:prstGeom>
+            <a:solidFill>
+              <a:srgbClr val="76201E"/>
+            </a:solidFill>
+            <a:ln>
+              <a:noFill/>
+            </a:ln>
+          </p:spPr>
+          <p:style>
+            <a:lnRef idx="1">
+              <a:schemeClr val="accent1"/>
+            </a:lnRef>
+            <a:fillRef idx="3">
+              <a:schemeClr val="accent1"/>
+            </a:fillRef>
+            <a:effectRef idx="2">
+              <a:schemeClr val="accent1"/>
+            </a:effectRef>
+            <a:fontRef idx="minor">
+              <a:schemeClr val="lt1"/>
+            </a:fontRef>
+          </p:style>
+          <p:txBody>
+            <a:bodyPr rtlCol="0" anchor="ctr"/>
+            <a:lstStyle/>
+            <a:p>
+              <a:pPr algn="ctr"/>
+              <a:endParaRPr lang="en-US" dirty="0">
+                <a:latin typeface="Arial Narrow"/>
+              </a:endParaRPr>
+            </a:p>
+          </p:txBody>
+        </p:sp>
+        <p:sp>
+          <p:nvSpPr>
+            <p:cNvPr id="6" name="Rectangle 5"/>
+            <p:cNvSpPr/>
+            <p:nvPr/>
+          </p:nvSpPr>
+          <p:spPr>
+            <a:xfrm>
+              <a:off x="340089" y="1394937"/>
+              <a:ext cx="671895" cy="572594"/>
+            </a:xfrm>
+            <a:prstGeom prst="rect">
+              <a:avLst/>
+            </a:prstGeom>
+            <a:solidFill>
+              <a:srgbClr val="9C2A27"/>
+            </a:solidFill>
+            <a:ln>
+              <a:noFill/>
+            </a:ln>
+          </p:spPr>
+          <p:style>
+            <a:lnRef idx="1">
+              <a:schemeClr val="accent1"/>
+            </a:lnRef>
+            <a:fillRef idx="3">
+              <a:schemeClr val="accent1"/>
+            </a:fillRef>
+            <a:effectRef idx="2">
+              <a:schemeClr val="accent1"/>
+            </a:effectRef>
+            <a:fontRef idx="minor">
+              <a:schemeClr val="lt1"/>
+            </a:fontRef>
+          </p:style>
+          <p:txBody>
+            <a:bodyPr rtlCol="0" anchor="ctr"/>
+            <a:lstStyle/>
+            <a:p>
+              <a:pPr algn="ctr"/>
+              <a:endParaRPr lang="en-US" dirty="0">
+                <a:latin typeface="Arial Narrow"/>
+              </a:endParaRPr>
+            </a:p>
+          </p:txBody>
+        </p:sp>
+      </p:grpSp>
+      <p:grpSp>
+        <p:nvGrpSpPr>
+          <p:cNvPr id="7" name="Group 6"/>
+          <p:cNvGrpSpPr/>
+          <p:nvPr/>
+        </p:nvGrpSpPr>
+        <p:grpSpPr>
+          <a:xfrm>
+            <a:off x="750486" y="2297954"/>
+            <a:ext cx="671896" cy="675145"/>
+            <a:chOff x="340088" y="1394937"/>
+            <a:chExt cx="671896" cy="911261"/>
+          </a:xfrm>
+        </p:grpSpPr>
+        <p:sp>
+          <p:nvSpPr>
+            <p:cNvPr id="8" name="Right Triangle 7"/>
+            <p:cNvSpPr/>
+            <p:nvPr/>
+          </p:nvSpPr>
+          <p:spPr>
+            <a:xfrm rot="10800000">
+              <a:off x="340088" y="1967531"/>
+              <a:ext cx="447525" cy="338667"/>
+            </a:xfrm>
+            <a:prstGeom prst="rtTriangle">
+              <a:avLst/>
+            </a:prstGeom>
+            <a:solidFill>
+              <a:srgbClr val="76201E"/>
+            </a:solidFill>
+            <a:ln>
+              <a:noFill/>
+            </a:ln>
+          </p:spPr>
+          <p:style>
+            <a:lnRef idx="1">
+              <a:schemeClr val="accent1"/>
+            </a:lnRef>
+            <a:fillRef idx="3">
+              <a:schemeClr val="accent1"/>
+            </a:fillRef>
+            <a:effectRef idx="2">
+              <a:schemeClr val="accent1"/>
+            </a:effectRef>
+            <a:fontRef idx="minor">
+              <a:schemeClr val="lt1"/>
+            </a:fontRef>
+          </p:style>
+          <p:txBody>
+            <a:bodyPr rtlCol="0" anchor="ctr"/>
+            <a:lstStyle/>
+            <a:p>
+              <a:pPr algn="ctr"/>
+              <a:endParaRPr lang="en-US" dirty="0">
+                <a:latin typeface="Arial Narrow"/>
+              </a:endParaRPr>
+            </a:p>
+          </p:txBody>
+        </p:sp>
+        <p:sp>
+          <p:nvSpPr>
+            <p:cNvPr id="9" name="Rectangle 8"/>
+            <p:cNvSpPr/>
+            <p:nvPr/>
+          </p:nvSpPr>
+          <p:spPr>
+            <a:xfrm>
+              <a:off x="340089" y="1394937"/>
+              <a:ext cx="671895" cy="572594"/>
+            </a:xfrm>
+            <a:prstGeom prst="rect">
+              <a:avLst/>
+            </a:prstGeom>
+            <a:solidFill>
+              <a:srgbClr val="9C2A27"/>
+            </a:solidFill>
+            <a:ln>
+              <a:noFill/>
+            </a:ln>
+          </p:spPr>
+          <p:style>
+            <a:lnRef idx="1">
+              <a:schemeClr val="accent1"/>
+            </a:lnRef>
+            <a:fillRef idx="3">
+              <a:schemeClr val="accent1"/>
+            </a:fillRef>
+            <a:effectRef idx="2">
+              <a:schemeClr val="accent1"/>
+            </a:effectRef>
+            <a:fontRef idx="minor">
+              <a:schemeClr val="lt1"/>
+            </a:fontRef>
+          </p:style>
+          <p:txBody>
+            <a:bodyPr rtlCol="0" anchor="ctr"/>
+            <a:lstStyle/>
+            <a:p>
+              <a:pPr algn="ctr"/>
+              <a:endParaRPr lang="en-US" dirty="0">
+                <a:latin typeface="Arial Narrow"/>
+              </a:endParaRPr>
+            </a:p>
+          </p:txBody>
+        </p:sp>
+      </p:grpSp>
+      <p:grpSp>
+        <p:nvGrpSpPr>
+          <p:cNvPr id="10" name="Group 9"/>
+          <p:cNvGrpSpPr/>
+          <p:nvPr/>
+        </p:nvGrpSpPr>
+        <p:grpSpPr>
+          <a:xfrm>
+            <a:off x="750486" y="3047804"/>
+            <a:ext cx="671896" cy="675145"/>
+            <a:chOff x="340088" y="1394937"/>
+            <a:chExt cx="671896" cy="911261"/>
+          </a:xfrm>
+        </p:grpSpPr>
+        <p:sp>
+          <p:nvSpPr>
+            <p:cNvPr id="11" name="Right Triangle 10"/>
+            <p:cNvSpPr/>
+            <p:nvPr/>
+          </p:nvSpPr>
+          <p:spPr>
+            <a:xfrm rot="10800000">
+              <a:off x="340088" y="1967531"/>
+              <a:ext cx="447525" cy="338667"/>
+            </a:xfrm>
+            <a:prstGeom prst="rtTriangle">
+              <a:avLst/>
+            </a:prstGeom>
+            <a:solidFill>
+              <a:srgbClr val="76201E"/>
+            </a:solidFill>
+            <a:ln>
+              <a:noFill/>
+            </a:ln>
+          </p:spPr>
+          <p:style>
+            <a:lnRef idx="1">
+              <a:schemeClr val="accent1"/>
+            </a:lnRef>
+            <a:fillRef idx="3">
+              <a:schemeClr val="accent1"/>
+            </a:fillRef>
+            <a:effectRef idx="2">
+              <a:schemeClr val="accent1"/>
+            </a:effectRef>
+            <a:fontRef idx="minor">
+              <a:schemeClr val="lt1"/>
+            </a:fontRef>
+          </p:style>
+          <p:txBody>
+            <a:bodyPr rtlCol="0" anchor="ctr"/>
+            <a:lstStyle/>
+            <a:p>
+              <a:pPr algn="ctr"/>
+              <a:endParaRPr lang="en-US" dirty="0">
+                <a:latin typeface="Arial Narrow"/>
+              </a:endParaRPr>
+            </a:p>
+          </p:txBody>
+        </p:sp>
+        <p:sp>
+          <p:nvSpPr>
+            <p:cNvPr id="12" name="Rectangle 11"/>
+            <p:cNvSpPr/>
+            <p:nvPr/>
+          </p:nvSpPr>
+          <p:spPr>
+            <a:xfrm>
+              <a:off x="340089" y="1394937"/>
+              <a:ext cx="671895" cy="572594"/>
+            </a:xfrm>
+            <a:prstGeom prst="rect">
+              <a:avLst/>
+            </a:prstGeom>
+            <a:solidFill>
+              <a:srgbClr val="9C2A27"/>
+            </a:solidFill>
+            <a:ln>
+              <a:noFill/>
+            </a:ln>
+          </p:spPr>
+          <p:style>
+            <a:lnRef idx="1">
+              <a:schemeClr val="accent1"/>
+            </a:lnRef>
+            <a:fillRef idx="3">
+              <a:schemeClr val="accent1"/>
+            </a:fillRef>
+            <a:effectRef idx="2">
+              <a:schemeClr val="accent1"/>
+            </a:effectRef>
+            <a:fontRef idx="minor">
+              <a:schemeClr val="lt1"/>
+            </a:fontRef>
+          </p:style>
+          <p:txBody>
+            <a:bodyPr rtlCol="0" anchor="ctr"/>
+            <a:lstStyle/>
+            <a:p>
+              <a:pPr algn="ctr"/>
+              <a:endParaRPr lang="en-US" dirty="0">
+                <a:latin typeface="Arial Narrow"/>
+              </a:endParaRPr>
+            </a:p>
+          </p:txBody>
+        </p:sp>
+      </p:grpSp>
+      <p:sp>
+        <p:nvSpPr>
+          <p:cNvPr id="3" name="Text Placeholder 2"/>
+          <p:cNvSpPr>
+            <a:spLocks noGrp="1"/>
+          </p:cNvSpPr>
+          <p:nvPr>
+            <p:ph type="body" sz="quarter" idx="11"/>
+          </p:nvPr>
+        </p:nvSpPr>
+        <p:spPr>
+          <a:xfrm>
+            <a:off x="899899" y="1341919"/>
+            <a:ext cx="6937375" cy="3528906"/>
+          </a:xfrm>
+        </p:spPr>
+        <p:txBody>
+          <a:bodyPr/>
+          <a:lstStyle/>
+          <a:p>
+            <a:pPr>
+              <a:lnSpc>
+                <a:spcPct val="150000"/>
+              </a:lnSpc>
+            </a:pPr>
+            <a:r>
+              <a:rPr lang="en-US" dirty="0"/>
+              <a:t>Introduction</a:t>
+            </a:r>
+          </a:p>
+          <a:p>
+            <a:pPr>
+              <a:lnSpc>
+                <a:spcPct val="150000"/>
+              </a:lnSpc>
+            </a:pPr>
+            <a:r>
+              <a:rPr lang="en-US" dirty="0"/>
+              <a:t>What?</a:t>
+            </a:r>
+          </a:p>
+          <a:p>
+            <a:pPr>
+              <a:lnSpc>
+                <a:spcPct val="150000"/>
+              </a:lnSpc>
+            </a:pPr>
+            <a:r>
+              <a:rPr lang="en-US" dirty="0"/>
+              <a:t>Why?</a:t>
+            </a:r>
+          </a:p>
+          <a:p>
+            <a:pPr>
+              <a:lnSpc>
+                <a:spcPct val="150000"/>
+              </a:lnSpc>
+            </a:pPr>
+            <a:r>
+              <a:rPr lang="en-US" dirty="0"/>
+              <a:t>How?</a:t>
+            </a:r>
+          </a:p>
+          <a:p>
+            <a:pPr>
+              <a:lnSpc>
+                <a:spcPct val="150000"/>
+              </a:lnSpc>
+            </a:pPr>
+            <a:endParaRPr lang="en-US" dirty="0"/>
+          </a:p>
+        </p:txBody>
+      </p:sp>
+    </p:spTree>
+    <p:extLst>
+      <p:ext uri="{BB962C8B-B14F-4D97-AF65-F5344CB8AC3E}">
+        <p14:creationId xmlns:p14="http://schemas.microsoft.com/office/powerpoint/2010/main" val="3285409007"/>
+      </p:ext>
+    </p:extLst>
+  </p:cSld>
+  <p:clrMapOvr>
+    <a:masterClrMapping/>
+  </p:clrMapOvr>
+</p:sld>
+</file>
+
+<file path=ppt/slides/slide3.xml><?xml version="1.0" encoding="utf-8"?>
+<p:sld xmlns:a="http://schemas.openxmlformats.org/drawingml/2006/main" xmlns:r="http://schemas.openxmlformats.org/officeDocument/2006/relationships" xmlns:p="http://schemas.openxmlformats.org/presentationml/2006/main">
+  <p:cSld>
+    <p:spTree>
+      <p:nvGrpSpPr>
+        <p:cNvPr id="1" name=""/>
+        <p:cNvGrpSpPr/>
+        <p:nvPr/>
+      </p:nvGrpSpPr>
+      <p:grpSpPr>
+        <a:xfrm>
+          <a:off x="0" y="0"/>
+          <a:ext cx="0" cy="0"/>
+          <a:chOff x="0" y="0"/>
+          <a:chExt cx="0" cy="0"/>
+        </a:xfrm>
+      </p:grpSpPr>
+      <p:sp>
+        <p:nvSpPr>
+          <p:cNvPr id="2" name="Text Placeholder 1"/>
+          <p:cNvSpPr>
+            <a:spLocks noGrp="1"/>
+          </p:cNvSpPr>
+          <p:nvPr>
+            <p:ph type="body" sz="quarter" idx="15"/>
+          </p:nvPr>
+        </p:nvSpPr>
+        <p:spPr/>
+        <p:txBody>
+          <a:bodyPr/>
+          <a:lstStyle/>
+          <a:p>
+            <a:r>
+              <a:rPr lang="en-US" dirty="0">
+                <a:solidFill>
+                  <a:schemeClr val="tx1"/>
+                </a:solidFill>
+              </a:rPr>
+              <a:t>Introduction</a:t>
+            </a:r>
+          </a:p>
+        </p:txBody>
+      </p:sp>
+      <p:sp>
+        <p:nvSpPr>
+          <p:cNvPr id="3" name="Text Placeholder 2"/>
+          <p:cNvSpPr>
+            <a:spLocks noGrp="1"/>
+          </p:cNvSpPr>
+          <p:nvPr>
+            <p:ph type="body" sz="quarter" idx="16"/>
+          </p:nvPr>
+        </p:nvSpPr>
+        <p:spPr/>
+        <p:txBody>
+          <a:bodyPr>
+            <a:normAutofit lnSpcReduction="10000"/>
+          </a:bodyPr>
+          <a:lstStyle/>
+          <a:p>
+            <a:r>
+              <a:rPr lang="en-US" dirty="0"/>
+              <a:t>PART ONE</a:t>
+            </a:r>
+          </a:p>
+        </p:txBody>
+      </p:sp>
+    </p:spTree>
+    <p:extLst>
+      <p:ext uri="{BB962C8B-B14F-4D97-AF65-F5344CB8AC3E}">
+        <p14:creationId xmlns:p14="http://schemas.microsoft.com/office/powerpoint/2010/main" val="1935180360"/>
+      </p:ext>
+    </p:extLst>
+  </p:cSld>
+  <p:clrMapOvr>
+    <a:masterClrMapping/>
+  </p:clrMapOvr>
+</p:sld>
+</file>
+
+<file path=ppt/slides/slide4.xml><?xml version="1.0" encoding="utf-8"?>
+<p:sld xmlns:a="http://schemas.openxmlformats.org/drawingml/2006/main" xmlns:r="http://schemas.openxmlformats.org/officeDocument/2006/relationships" xmlns:p="http://schemas.openxmlformats.org/presentationml/2006/main">
+  <p:cSld>
+    <p:spTree>
+      <p:nvGrpSpPr>
+        <p:cNvPr id="1" name=""/>
+        <p:cNvGrpSpPr/>
+        <p:nvPr/>
+      </p:nvGrpSpPr>
+      <p:grpSpPr>
+        <a:xfrm>
+          <a:off x="0" y="0"/>
+          <a:ext cx="0" cy="0"/>
+          <a:chOff x="0" y="0"/>
+          <a:chExt cx="0" cy="0"/>
+        </a:xfrm>
+      </p:grpSpPr>
+      <p:sp>
+        <p:nvSpPr>
+          <p:cNvPr id="2" name="Text Placeholder 1"/>
+          <p:cNvSpPr>
+            <a:spLocks noGrp="1"/>
+          </p:cNvSpPr>
+          <p:nvPr>
+            <p:ph type="body" sz="quarter" idx="15"/>
+          </p:nvPr>
+        </p:nvSpPr>
+        <p:spPr/>
+        <p:txBody>
+          <a:bodyPr/>
+          <a:lstStyle/>
+          <a:p>
+            <a:r>
+              <a:rPr lang="en-US" dirty="0">
+                <a:solidFill>
+                  <a:schemeClr val="tx1"/>
+                </a:solidFill>
+              </a:rPr>
+              <a:t>WHAT IS THIS?</a:t>
+            </a:r>
+          </a:p>
+        </p:txBody>
+      </p:sp>
+      <p:sp>
+        <p:nvSpPr>
+          <p:cNvPr id="3" name="Text Placeholder 2"/>
+          <p:cNvSpPr>
+            <a:spLocks noGrp="1"/>
+          </p:cNvSpPr>
+          <p:nvPr>
+            <p:ph type="body" sz="quarter" idx="16"/>
+          </p:nvPr>
+        </p:nvSpPr>
+        <p:spPr/>
+        <p:txBody>
+          <a:bodyPr>
+            <a:normAutofit lnSpcReduction="10000"/>
+          </a:bodyPr>
+          <a:lstStyle/>
+          <a:p>
+            <a:r>
+              <a:rPr lang="en-US" dirty="0"/>
+              <a:t>PART TWO</a:t>
+            </a:r>
+          </a:p>
+          <a:p>
+            <a:endParaRPr lang="en-US" dirty="0"/>
+          </a:p>
+        </p:txBody>
+      </p:sp>
+    </p:spTree>
+    <p:extLst>
+      <p:ext uri="{BB962C8B-B14F-4D97-AF65-F5344CB8AC3E}">
+        <p14:creationId xmlns:p14="http://schemas.microsoft.com/office/powerpoint/2010/main" val="1253312345"/>
+      </p:ext>
+    </p:extLst>
+  </p:cSld>
+  <p:clrMapOvr>
+    <a:masterClrMapping/>
+  </p:clrMapOvr>
+</p:sld>
+</file>
+
+<file path=ppt/slides/slide5.xml><?xml version="1.0" encoding="utf-8"?>
+<p:sld xmlns:a="http://schemas.openxmlformats.org/drawingml/2006/main" xmlns:r="http://schemas.openxmlformats.org/officeDocument/2006/relationships" xmlns:p="http://schemas.openxmlformats.org/presentationml/2006/main">
+  <p:cSld>
+    <p:spTree>
+      <p:nvGrpSpPr>
+        <p:cNvPr id="1" name=""/>
+        <p:cNvGrpSpPr/>
+        <p:nvPr/>
+      </p:nvGrpSpPr>
+      <p:grpSpPr>
+        <a:xfrm>
+          <a:off x="0" y="0"/>
+          <a:ext cx="0" cy="0"/>
+          <a:chOff x="0" y="0"/>
+          <a:chExt cx="0" cy="0"/>
+        </a:xfrm>
+      </p:grpSpPr>
+      <p:sp>
+        <p:nvSpPr>
+          <p:cNvPr id="3" name="Text Placeholder 2"/>
+          <p:cNvSpPr>
+            <a:spLocks noGrp="1"/>
+          </p:cNvSpPr>
+          <p:nvPr>
+            <p:ph type="body" sz="quarter" idx="11"/>
+          </p:nvPr>
+        </p:nvSpPr>
+        <p:spPr/>
+        <p:txBody>
+          <a:bodyPr/>
+          <a:lstStyle/>
+          <a:p>
+            <a:r>
+              <a:rPr lang="en-US" dirty="0"/>
+              <a:t>Quiz app</a:t>
+            </a:r>
+          </a:p>
+        </p:txBody>
+      </p:sp>
+    </p:spTree>
+    <p:extLst>
+      <p:ext uri="{BB962C8B-B14F-4D97-AF65-F5344CB8AC3E}">
+        <p14:creationId xmlns:p14="http://schemas.microsoft.com/office/powerpoint/2010/main" val="3150657100"/>
+      </p:ext>
+    </p:extLst>
+  </p:cSld>
+  <p:clrMapOvr>
+    <a:masterClrMapping/>
+  </p:clrMapOvr>
+</p:sld>
+</file>
+
+<file path=ppt/slides/slide6.xml><?xml version="1.0" encoding="utf-8"?>
+<p:sld xmlns:a="http://schemas.openxmlformats.org/drawingml/2006/main" xmlns:r="http://schemas.openxmlformats.org/officeDocument/2006/relationships" xmlns:p="http://schemas.openxmlformats.org/presentationml/2006/main">
+  <p:cSld>
+    <p:spTree>
+      <p:nvGrpSpPr>
+        <p:cNvPr id="1" name=""/>
+        <p:cNvGrpSpPr/>
+        <p:nvPr/>
+      </p:nvGrpSpPr>
+      <p:grpSpPr>
+        <a:xfrm>
+          <a:off x="0" y="0"/>
+          <a:ext cx="0" cy="0"/>
+          <a:chOff x="0" y="0"/>
+          <a:chExt cx="0" cy="0"/>
+        </a:xfrm>
+      </p:grpSpPr>
+      <p:grpSp>
+        <p:nvGrpSpPr>
+          <p:cNvPr id="7" name="Group 6"/>
+          <p:cNvGrpSpPr/>
+          <p:nvPr/>
+        </p:nvGrpSpPr>
+        <p:grpSpPr>
+          <a:xfrm>
+            <a:off x="750486" y="2297954"/>
+            <a:ext cx="671896" cy="675145"/>
+            <a:chOff x="340088" y="1394937"/>
+            <a:chExt cx="671896" cy="911261"/>
+          </a:xfrm>
+        </p:grpSpPr>
+        <p:sp>
+          <p:nvSpPr>
+            <p:cNvPr id="8" name="Right Triangle 7"/>
+            <p:cNvSpPr/>
+            <p:nvPr/>
+          </p:nvSpPr>
+          <p:spPr>
+            <a:xfrm rot="10800000">
+              <a:off x="340088" y="1967531"/>
+              <a:ext cx="447525" cy="338667"/>
+            </a:xfrm>
+            <a:prstGeom prst="rtTriangle">
+              <a:avLst/>
+            </a:prstGeom>
+            <a:solidFill>
+              <a:srgbClr val="76201E"/>
+            </a:solidFill>
+            <a:ln>
+              <a:noFill/>
+            </a:ln>
+          </p:spPr>
+          <p:style>
+            <a:lnRef idx="1">
+              <a:schemeClr val="accent1"/>
+            </a:lnRef>
+            <a:fillRef idx="3">
+              <a:schemeClr val="accent1"/>
+            </a:fillRef>
+            <a:effectRef idx="2">
+              <a:schemeClr val="accent1"/>
+            </a:effectRef>
+            <a:fontRef idx="minor">
+              <a:schemeClr val="lt1"/>
+            </a:fontRef>
+          </p:style>
+          <p:txBody>
+            <a:bodyPr rtlCol="0" anchor="ctr"/>
+            <a:lstStyle/>
+            <a:p>
+              <a:pPr algn="ctr"/>
+              <a:endParaRPr lang="en-US" dirty="0">
+                <a:latin typeface="Arial Narrow"/>
+              </a:endParaRPr>
+            </a:p>
+          </p:txBody>
+        </p:sp>
+        <p:sp>
+          <p:nvSpPr>
+            <p:cNvPr id="9" name="Rectangle 8"/>
+            <p:cNvSpPr/>
+            <p:nvPr/>
+          </p:nvSpPr>
+          <p:spPr>
+            <a:xfrm>
+              <a:off x="340089" y="1394937"/>
+              <a:ext cx="671895" cy="572594"/>
+            </a:xfrm>
+            <a:prstGeom prst="rect">
+              <a:avLst/>
+            </a:prstGeom>
+            <a:solidFill>
+              <a:srgbClr val="9C2A27"/>
+            </a:solidFill>
+            <a:ln>
+              <a:noFill/>
+            </a:ln>
+          </p:spPr>
+          <p:style>
+            <a:lnRef idx="1">
+              <a:schemeClr val="accent1"/>
+            </a:lnRef>
+            <a:fillRef idx="3">
+              <a:schemeClr val="accent1"/>
+            </a:fillRef>
+            <a:effectRef idx="2">
+              <a:schemeClr val="accent1"/>
+            </a:effectRef>
+            <a:fontRef idx="minor">
+              <a:schemeClr val="lt1"/>
+            </a:fontRef>
+          </p:style>
+          <p:txBody>
+            <a:bodyPr rtlCol="0" anchor="ctr"/>
+            <a:lstStyle/>
+            <a:p>
+              <a:pPr algn="ctr"/>
+              <a:endParaRPr lang="en-US" dirty="0">
+                <a:latin typeface="Arial Narrow"/>
+              </a:endParaRPr>
+            </a:p>
+          </p:txBody>
+        </p:sp>
+      </p:grpSp>
+      <p:grpSp>
+        <p:nvGrpSpPr>
+          <p:cNvPr id="10" name="Group 9"/>
+          <p:cNvGrpSpPr/>
+          <p:nvPr/>
+        </p:nvGrpSpPr>
+        <p:grpSpPr>
+          <a:xfrm>
+            <a:off x="750486" y="3047804"/>
+            <a:ext cx="671896" cy="675145"/>
+            <a:chOff x="340088" y="1394937"/>
+            <a:chExt cx="671896" cy="911261"/>
+          </a:xfrm>
+        </p:grpSpPr>
+        <p:sp>
+          <p:nvSpPr>
+            <p:cNvPr id="11" name="Right Triangle 10"/>
+            <p:cNvSpPr/>
+            <p:nvPr/>
+          </p:nvSpPr>
+          <p:spPr>
+            <a:xfrm rot="10800000">
+              <a:off x="340088" y="1967531"/>
+              <a:ext cx="447525" cy="338667"/>
+            </a:xfrm>
+            <a:prstGeom prst="rtTriangle">
+              <a:avLst/>
+            </a:prstGeom>
+            <a:solidFill>
+              <a:srgbClr val="76201E"/>
+            </a:solidFill>
+            <a:ln>
+              <a:noFill/>
+            </a:ln>
+          </p:spPr>
+          <p:style>
+            <a:lnRef idx="1">
+              <a:schemeClr val="accent1"/>
+            </a:lnRef>
+            <a:fillRef idx="3">
+              <a:schemeClr val="accent1"/>
+            </a:fillRef>
+            <a:effectRef idx="2">
+              <a:schemeClr val="accent1"/>
+            </a:effectRef>
+            <a:fontRef idx="minor">
+              <a:schemeClr val="lt1"/>
+            </a:fontRef>
+          </p:style>
+          <p:txBody>
+            <a:bodyPr rtlCol="0" anchor="ctr"/>
+            <a:lstStyle/>
+            <a:p>
+              <a:pPr algn="ctr"/>
+              <a:endParaRPr lang="en-US" dirty="0">
+                <a:latin typeface="Arial Narrow"/>
+              </a:endParaRPr>
+            </a:p>
+          </p:txBody>
+        </p:sp>
+        <p:sp>
+          <p:nvSpPr>
+            <p:cNvPr id="12" name="Rectangle 11"/>
+            <p:cNvSpPr/>
+            <p:nvPr/>
+          </p:nvSpPr>
+          <p:spPr>
+            <a:xfrm>
+              <a:off x="340089" y="1394937"/>
+              <a:ext cx="671895" cy="572594"/>
+            </a:xfrm>
+            <a:prstGeom prst="rect">
+              <a:avLst/>
+            </a:prstGeom>
+            <a:solidFill>
+              <a:srgbClr val="9C2A27"/>
+            </a:solidFill>
+            <a:ln>
+              <a:noFill/>
+            </a:ln>
+          </p:spPr>
+          <p:style>
+            <a:lnRef idx="1">
+              <a:schemeClr val="accent1"/>
+            </a:lnRef>
+            <a:fillRef idx="3">
+              <a:schemeClr val="accent1"/>
+            </a:fillRef>
+            <a:effectRef idx="2">
+              <a:schemeClr val="accent1"/>
+            </a:effectRef>
+            <a:fontRef idx="minor">
+              <a:schemeClr val="lt1"/>
+            </a:fontRef>
+          </p:style>
+          <p:txBody>
+            <a:bodyPr rtlCol="0" anchor="ctr"/>
+            <a:lstStyle/>
+            <a:p>
+              <a:pPr algn="ctr"/>
+              <a:endParaRPr lang="en-US" dirty="0">
+                <a:latin typeface="Arial Narrow"/>
+              </a:endParaRPr>
+            </a:p>
+          </p:txBody>
+        </p:sp>
+      </p:grpSp>
+      <p:sp>
+        <p:nvSpPr>
+          <p:cNvPr id="3" name="Text Placeholder 2"/>
+          <p:cNvSpPr>
+            <a:spLocks noGrp="1"/>
+          </p:cNvSpPr>
+          <p:nvPr>
+            <p:ph type="body" sz="quarter" idx="11"/>
+          </p:nvPr>
+        </p:nvSpPr>
+        <p:spPr>
+          <a:xfrm>
+            <a:off x="899899" y="1341919"/>
+            <a:ext cx="6937375" cy="3528906"/>
+          </a:xfrm>
+        </p:spPr>
+        <p:txBody>
+          <a:bodyPr/>
+          <a:lstStyle/>
+          <a:p>
+            <a:pPr>
+              <a:lnSpc>
+                <a:spcPct val="150000"/>
+              </a:lnSpc>
+            </a:pPr>
+            <a:r>
+              <a:rPr lang="en-US" dirty="0"/>
+              <a:t>Quiz application</a:t>
+            </a:r>
+          </a:p>
+          <a:p>
+            <a:pPr>
+              <a:lnSpc>
+                <a:spcPct val="150000"/>
+              </a:lnSpc>
+            </a:pPr>
+            <a:r>
+              <a:rPr lang="en-US" dirty="0"/>
+              <a:t>Different Subjects</a:t>
+            </a:r>
+          </a:p>
+          <a:p>
+            <a:pPr>
+              <a:lnSpc>
+                <a:spcPct val="150000"/>
+              </a:lnSpc>
+            </a:pPr>
+            <a:r>
+              <a:rPr lang="en-US" dirty="0"/>
+              <a:t>MCQ tests</a:t>
+            </a:r>
+          </a:p>
+        </p:txBody>
+      </p:sp>
+      <p:sp>
+        <p:nvSpPr>
+          <p:cNvPr id="13" name="Text Placeholder 1">
+            <a:extLst>
+              <a:ext uri="{FF2B5EF4-FFF2-40B4-BE49-F238E27FC236}">
+                <a16:creationId xmlns:a16="http://schemas.microsoft.com/office/drawing/2014/main" id="{04822AC0-D457-4470-8D2F-C78F33EBB912}"/>
+              </a:ext>
+            </a:extLst>
+          </p:cNvPr>
+          <p:cNvSpPr txBox="1">
+            <a:spLocks/>
+          </p:cNvSpPr>
+          <p:nvPr/>
+        </p:nvSpPr>
+        <p:spPr>
+          <a:xfrm>
+            <a:off x="750487" y="466256"/>
+            <a:ext cx="4713288" cy="1395412"/>
+          </a:xfrm>
+          <a:prstGeom prst="rect">
+            <a:avLst/>
+          </a:prstGeom>
+        </p:spPr>
+        <p:txBody>
+          <a:bodyPr/>
+          <a:lstStyle>
+            <a:lvl1pPr marL="342900" indent="-342900" algn="l" defTabSz="457200" rtl="0" eaLnBrk="1" latinLnBrk="0" hangingPunct="1">
+              <a:spcBef>
+                <a:spcPct val="20000"/>
+              </a:spcBef>
+              <a:buClr>
+                <a:schemeClr val="accent2">
+                  <a:lumMod val="75000"/>
+                </a:schemeClr>
+              </a:buClr>
+              <a:buFont typeface="Arial"/>
+              <a:buChar char="•"/>
+              <a:defRPr sz="3200" b="0" i="0" kern="1200">
+                <a:solidFill>
+                  <a:schemeClr val="tx1">
+                    <a:lumMod val="50000"/>
+                  </a:schemeClr>
+                </a:solidFill>
+                <a:latin typeface="Helvetica Light"/>
+                <a:ea typeface="+mn-ea"/>
+                <a:cs typeface="Helvetica Light"/>
+              </a:defRPr>
+            </a:lvl1pPr>
+            <a:lvl2pPr marL="742950" indent="-285750" algn="l" defTabSz="457200" rtl="0" eaLnBrk="1" latinLnBrk="0" hangingPunct="1">
+              <a:spcBef>
+                <a:spcPct val="20000"/>
+              </a:spcBef>
+              <a:buClr>
+                <a:schemeClr val="accent2">
+                  <a:lumMod val="75000"/>
+                </a:schemeClr>
+              </a:buClr>
+              <a:buFont typeface="Arial" panose="020B0604020202020204" pitchFamily="34" charset="0"/>
+              <a:buChar char="•"/>
+              <a:defRPr sz="2400" b="0" i="0" kern="1200">
+                <a:solidFill>
+                  <a:schemeClr val="tx1">
+                    <a:lumMod val="50000"/>
+                  </a:schemeClr>
+                </a:solidFill>
+                <a:latin typeface="Helvetica Light"/>
+                <a:ea typeface="+mn-ea"/>
+                <a:cs typeface="Helvetica Light"/>
+              </a:defRPr>
+            </a:lvl2pPr>
+            <a:lvl3pPr marL="1143000" indent="-228600" algn="l" defTabSz="457200" rtl="0" eaLnBrk="1" latinLnBrk="0" hangingPunct="1">
+              <a:spcBef>
+                <a:spcPct val="20000"/>
+              </a:spcBef>
+              <a:buClr>
+                <a:schemeClr val="accent2">
+                  <a:lumMod val="75000"/>
+                </a:schemeClr>
+              </a:buClr>
+              <a:buFont typeface="Arial"/>
+              <a:buChar char="•"/>
+              <a:defRPr sz="2400" b="0" i="0" kern="1200">
+                <a:solidFill>
+                  <a:schemeClr val="tx1">
+                    <a:lumMod val="50000"/>
+                  </a:schemeClr>
+                </a:solidFill>
+                <a:latin typeface="Helvetica Light"/>
+                <a:ea typeface="+mn-ea"/>
+                <a:cs typeface="Helvetica Light"/>
+              </a:defRPr>
+            </a:lvl3pPr>
+            <a:lvl4pPr marL="1600200" indent="-228600" algn="l" defTabSz="457200" rtl="0" eaLnBrk="1" latinLnBrk="0" hangingPunct="1">
+              <a:spcBef>
+                <a:spcPct val="20000"/>
+              </a:spcBef>
+              <a:buClr>
+                <a:schemeClr val="accent2">
+                  <a:lumMod val="75000"/>
+                </a:schemeClr>
+              </a:buClr>
+              <a:buFont typeface="Arial" panose="020B0604020202020204" pitchFamily="34" charset="0"/>
+              <a:buChar char="•"/>
+              <a:defRPr sz="2000" b="0" i="0" kern="1200">
+                <a:solidFill>
+                  <a:schemeClr val="tx1">
+                    <a:lumMod val="50000"/>
+                  </a:schemeClr>
+                </a:solidFill>
+                <a:latin typeface="Helvetica Light"/>
+                <a:ea typeface="+mn-ea"/>
+                <a:cs typeface="Helvetica Light"/>
+              </a:defRPr>
+            </a:lvl4pPr>
+            <a:lvl5pPr marL="2057400" indent="-228600" algn="l" defTabSz="457200" rtl="0" eaLnBrk="1" latinLnBrk="0" hangingPunct="1">
+              <a:spcBef>
+                <a:spcPct val="20000"/>
+              </a:spcBef>
+              <a:buClr>
+                <a:schemeClr val="accent2">
+                  <a:lumMod val="75000"/>
+                </a:schemeClr>
+              </a:buClr>
+              <a:buFont typeface="Arial" panose="020B0604020202020204" pitchFamily="34" charset="0"/>
+              <a:buChar char="•"/>
+              <a:defRPr sz="2000" b="0" i="0" kern="1200">
+                <a:solidFill>
+                  <a:schemeClr val="tx1">
+                    <a:lumMod val="50000"/>
+                  </a:schemeClr>
+                </a:solidFill>
+                <a:latin typeface="Helvetica Light"/>
+                <a:ea typeface="+mn-ea"/>
+                <a:cs typeface="Helvetica Light"/>
+              </a:defRPr>
+            </a:lvl5pPr>
+            <a:lvl6pPr marL="2514600" indent="-228600" algn="l" defTabSz="457200" rtl="0" eaLnBrk="1" latinLnBrk="0" hangingPunct="1">
+              <a:spcBef>
+                <a:spcPct val="20000"/>
+              </a:spcBef>
+              <a:buFont typeface="Arial"/>
+              <a:buChar char="•"/>
+              <a:defRPr sz="2000" kern="1200">
+                <a:solidFill>
+                  <a:schemeClr val="tx1"/>
+                </a:solidFill>
+                <a:latin typeface="+mn-lt"/>
+                <a:ea typeface="+mn-ea"/>
+                <a:cs typeface="+mn-cs"/>
+              </a:defRPr>
+            </a:lvl6pPr>
+            <a:lvl7pPr marL="2971800" indent="-228600" algn="l" defTabSz="457200" rtl="0" eaLnBrk="1" latinLnBrk="0" hangingPunct="1">
+              <a:spcBef>
+                <a:spcPct val="20000"/>
+              </a:spcBef>
+              <a:buFont typeface="Arial"/>
+              <a:buChar char="•"/>
+              <a:defRPr sz="2000" kern="1200">
+                <a:solidFill>
+                  <a:schemeClr val="tx1"/>
+                </a:solidFill>
+                <a:latin typeface="+mn-lt"/>
+                <a:ea typeface="+mn-ea"/>
+                <a:cs typeface="+mn-cs"/>
+              </a:defRPr>
+            </a:lvl7pPr>
+            <a:lvl8pPr marL="3429000" indent="-228600" algn="l" defTabSz="457200" rtl="0" eaLnBrk="1" latinLnBrk="0" hangingPunct="1">
+              <a:spcBef>
+                <a:spcPct val="20000"/>
+              </a:spcBef>
+              <a:buFont typeface="Arial"/>
+              <a:buChar char="•"/>
+              <a:defRPr sz="2000" kern="1200">
+                <a:solidFill>
+                  <a:schemeClr val="tx1"/>
+                </a:solidFill>
+                <a:latin typeface="+mn-lt"/>
+                <a:ea typeface="+mn-ea"/>
+                <a:cs typeface="+mn-cs"/>
+              </a:defRPr>
+            </a:lvl8pPr>
+            <a:lvl9pPr marL="3886200" indent="-228600" algn="l" defTabSz="457200" rtl="0" eaLnBrk="1" latinLnBrk="0" hangingPunct="1">
+              <a:spcBef>
+                <a:spcPct val="20000"/>
+              </a:spcBef>
+              <a:buFont typeface="Arial"/>
+              <a:buChar char="•"/>
+              <a:defRPr sz="2000" kern="1200">
+                <a:solidFill>
+                  <a:schemeClr val="tx1"/>
+                </a:solidFill>
+                <a:latin typeface="+mn-lt"/>
+                <a:ea typeface="+mn-ea"/>
+                <a:cs typeface="+mn-cs"/>
+              </a:defRPr>
+            </a:lvl9pPr>
+          </a:lstStyle>
+          <a:p>
+            <a:r>
+              <a:rPr lang="en-US">
+                <a:solidFill>
+                  <a:schemeClr val="tx1"/>
+                </a:solidFill>
+              </a:rPr>
+              <a:t>WHAT IS THIS?</a:t>
+            </a:r>
+            <a:endParaRPr lang="en-US" dirty="0">
+              <a:solidFill>
+                <a:schemeClr val="tx1"/>
+              </a:solidFill>
+            </a:endParaRPr>
+          </a:p>
+        </p:txBody>
+      </p:sp>
+    </p:spTree>
+    <p:extLst>
+      <p:ext uri="{BB962C8B-B14F-4D97-AF65-F5344CB8AC3E}">
+        <p14:creationId xmlns:p14="http://schemas.microsoft.com/office/powerpoint/2010/main" val="2870960474"/>
+      </p:ext>
+    </p:extLst>
+  </p:cSld>
+  <p:clrMapOvr>
+    <a:masterClrMapping/>
+  </p:clrMapOvr>
+</p:sld>
+</file>
+
+<file path=ppt/slides/slide7.xml><?xml version="1.0" encoding="utf-8"?>
+<p:sld xmlns:a="http://schemas.openxmlformats.org/drawingml/2006/main" xmlns:r="http://schemas.openxmlformats.org/officeDocument/2006/relationships" xmlns:p="http://schemas.openxmlformats.org/presentationml/2006/main">
+  <p:cSld>
+    <p:spTree>
+      <p:nvGrpSpPr>
+        <p:cNvPr id="1" name=""/>
+        <p:cNvGrpSpPr/>
+        <p:nvPr/>
+      </p:nvGrpSpPr>
+      <p:grpSpPr>
+        <a:xfrm>
+          <a:off x="0" y="0"/>
+          <a:ext cx="0" cy="0"/>
+          <a:chOff x="0" y="0"/>
+          <a:chExt cx="0" cy="0"/>
+        </a:xfrm>
+      </p:grpSpPr>
+      <p:sp>
+        <p:nvSpPr>
+          <p:cNvPr id="2" name="Text Placeholder 1"/>
+          <p:cNvSpPr>
+            <a:spLocks noGrp="1"/>
+          </p:cNvSpPr>
+          <p:nvPr>
+            <p:ph type="body" sz="quarter" idx="15"/>
+          </p:nvPr>
+        </p:nvSpPr>
+        <p:spPr/>
+        <p:txBody>
+          <a:bodyPr/>
+          <a:lstStyle/>
+          <a:p>
+            <a:r>
+              <a:rPr lang="en-US" dirty="0">
+                <a:solidFill>
+                  <a:schemeClr val="tx1"/>
+                </a:solidFill>
+              </a:rPr>
+              <a:t>Why Quiz app?</a:t>
+            </a:r>
+          </a:p>
+        </p:txBody>
+      </p:sp>
+      <p:sp>
+        <p:nvSpPr>
+          <p:cNvPr id="3" name="Text Placeholder 2"/>
+          <p:cNvSpPr>
+            <a:spLocks noGrp="1"/>
+          </p:cNvSpPr>
+          <p:nvPr>
+            <p:ph type="body" sz="quarter" idx="16"/>
+          </p:nvPr>
+        </p:nvSpPr>
+        <p:spPr/>
+        <p:txBody>
+          <a:bodyPr>
+            <a:normAutofit fontScale="92500"/>
+          </a:bodyPr>
+          <a:lstStyle/>
+          <a:p>
+            <a:r>
+              <a:rPr lang="en-US" dirty="0"/>
+              <a:t>PART THREE</a:t>
+            </a:r>
+          </a:p>
+        </p:txBody>
+      </p:sp>
+    </p:spTree>
+    <p:extLst>
+      <p:ext uri="{BB962C8B-B14F-4D97-AF65-F5344CB8AC3E}">
+        <p14:creationId xmlns:p14="http://schemas.microsoft.com/office/powerpoint/2010/main" val="3843190201"/>
+      </p:ext>
+    </p:extLst>
+  </p:cSld>
+  <p:clrMapOvr>
+    <a:masterClrMapping/>
+  </p:clrMapOvr>
+</p:sld>
+</file>
+
+<file path=ppt/slides/slide8.xml><?xml version="1.0" encoding="utf-8"?>
+<p:sld xmlns:a="http://schemas.openxmlformats.org/drawingml/2006/main" xmlns:r="http://schemas.openxmlformats.org/officeDocument/2006/relationships" xmlns:p="http://schemas.openxmlformats.org/presentationml/2006/main">
+  <p:cSld>
+    <p:spTree>
+      <p:nvGrpSpPr>
+        <p:cNvPr id="1" name=""/>
+        <p:cNvGrpSpPr/>
+        <p:nvPr/>
+      </p:nvGrpSpPr>
+      <p:grpSpPr>
+        <a:xfrm>
+          <a:off x="0" y="0"/>
+          <a:ext cx="0" cy="0"/>
+          <a:chOff x="0" y="0"/>
+          <a:chExt cx="0" cy="0"/>
+        </a:xfrm>
+      </p:grpSpPr>
+      <p:grpSp>
+        <p:nvGrpSpPr>
+          <p:cNvPr id="7" name="Group 6"/>
+          <p:cNvGrpSpPr/>
+          <p:nvPr/>
+        </p:nvGrpSpPr>
+        <p:grpSpPr>
+          <a:xfrm>
+            <a:off x="750486" y="2297954"/>
+            <a:ext cx="671896" cy="675145"/>
+            <a:chOff x="340088" y="1394937"/>
+            <a:chExt cx="671896" cy="911261"/>
+          </a:xfrm>
+        </p:grpSpPr>
+        <p:sp>
+          <p:nvSpPr>
+            <p:cNvPr id="8" name="Right Triangle 7"/>
+            <p:cNvSpPr/>
+            <p:nvPr/>
+          </p:nvSpPr>
+          <p:spPr>
+            <a:xfrm rot="10800000">
+              <a:off x="340088" y="1967531"/>
+              <a:ext cx="447525" cy="338667"/>
+            </a:xfrm>
+            <a:prstGeom prst="rtTriangle">
+              <a:avLst/>
+            </a:prstGeom>
+            <a:solidFill>
+              <a:srgbClr val="76201E"/>
+            </a:solidFill>
+            <a:ln>
+              <a:noFill/>
+            </a:ln>
+          </p:spPr>
+          <p:style>
+            <a:lnRef idx="1">
+              <a:schemeClr val="accent1"/>
+            </a:lnRef>
+            <a:fillRef idx="3">
+              <a:schemeClr val="accent1"/>
+            </a:fillRef>
+            <a:effectRef idx="2">
+              <a:schemeClr val="accent1"/>
+            </a:effectRef>
+            <a:fontRef idx="minor">
+              <a:schemeClr val="lt1"/>
+            </a:fontRef>
+          </p:style>
+          <p:txBody>
+            <a:bodyPr rtlCol="0" anchor="ctr"/>
+            <a:lstStyle/>
+            <a:p>
+              <a:pPr algn="ctr"/>
+              <a:endParaRPr lang="en-US" dirty="0">
+                <a:latin typeface="Arial Narrow"/>
+              </a:endParaRPr>
+            </a:p>
+          </p:txBody>
+        </p:sp>
+        <p:sp>
+          <p:nvSpPr>
+            <p:cNvPr id="9" name="Rectangle 8"/>
+            <p:cNvSpPr/>
+            <p:nvPr/>
+          </p:nvSpPr>
+          <p:spPr>
+            <a:xfrm>
+              <a:off x="340089" y="1394937"/>
+              <a:ext cx="671895" cy="572594"/>
+            </a:xfrm>
+            <a:prstGeom prst="rect">
+              <a:avLst/>
+            </a:prstGeom>
+            <a:solidFill>
+              <a:srgbClr val="9C2A27"/>
+            </a:solidFill>
+            <a:ln>
+              <a:noFill/>
+            </a:ln>
+          </p:spPr>
+          <p:style>
+            <a:lnRef idx="1">
+              <a:schemeClr val="accent1"/>
+            </a:lnRef>
+            <a:fillRef idx="3">
+              <a:schemeClr val="accent1"/>
+            </a:fillRef>
+            <a:effectRef idx="2">
+              <a:schemeClr val="accent1"/>
+            </a:effectRef>
+            <a:fontRef idx="minor">
+              <a:schemeClr val="lt1"/>
+            </a:fontRef>
+          </p:style>
+          <p:txBody>
+            <a:bodyPr rtlCol="0" anchor="ctr"/>
+            <a:lstStyle/>
+            <a:p>
+              <a:pPr algn="ctr"/>
+              <a:endParaRPr lang="en-US" dirty="0">
+                <a:latin typeface="Arial Narrow"/>
+              </a:endParaRPr>
+            </a:p>
+          </p:txBody>
+        </p:sp>
+      </p:grpSp>
+      <p:sp>
+        <p:nvSpPr>
+          <p:cNvPr id="3" name="Text Placeholder 2"/>
+          <p:cNvSpPr>
+            <a:spLocks noGrp="1"/>
+          </p:cNvSpPr>
+          <p:nvPr>
+            <p:ph type="body" sz="quarter" idx="11"/>
+          </p:nvPr>
+        </p:nvSpPr>
+        <p:spPr>
+          <a:xfrm>
+            <a:off x="899899" y="1341919"/>
+            <a:ext cx="6937375" cy="3528906"/>
+          </a:xfrm>
+        </p:spPr>
+        <p:txBody>
+          <a:bodyPr/>
+          <a:lstStyle/>
+          <a:p>
+            <a:pPr>
+              <a:lnSpc>
+                <a:spcPct val="150000"/>
+              </a:lnSpc>
+            </a:pPr>
+            <a:r>
+              <a:rPr lang="en-US" dirty="0"/>
+              <a:t>To learn how android works</a:t>
+            </a:r>
+          </a:p>
+          <a:p>
+            <a:pPr>
+              <a:lnSpc>
+                <a:spcPct val="150000"/>
+              </a:lnSpc>
+            </a:pPr>
+            <a:r>
+              <a:rPr lang="en-US" dirty="0"/>
+              <a:t>To learn new technology</a:t>
+            </a:r>
+          </a:p>
+        </p:txBody>
+      </p:sp>
+      <p:sp>
+        <p:nvSpPr>
+          <p:cNvPr id="13" name="Text Placeholder 1">
+            <a:extLst>
+              <a:ext uri="{FF2B5EF4-FFF2-40B4-BE49-F238E27FC236}">
+                <a16:creationId xmlns:a16="http://schemas.microsoft.com/office/drawing/2014/main" id="{6F8D4FFB-CA47-464D-95A6-4E44C45855A7}"/>
+              </a:ext>
+            </a:extLst>
+          </p:cNvPr>
+          <p:cNvSpPr txBox="1">
+            <a:spLocks/>
+          </p:cNvSpPr>
+          <p:nvPr/>
+        </p:nvSpPr>
+        <p:spPr>
+          <a:xfrm>
+            <a:off x="1086434" y="364281"/>
+            <a:ext cx="4713288" cy="1395412"/>
+          </a:xfrm>
+          <a:prstGeom prst="rect">
+            <a:avLst/>
+          </a:prstGeom>
+        </p:spPr>
+        <p:txBody>
+          <a:bodyPr/>
+          <a:lstStyle>
+            <a:lvl1pPr marL="342900" indent="-342900" algn="l" defTabSz="457200" rtl="0" eaLnBrk="1" latinLnBrk="0" hangingPunct="1">
+              <a:spcBef>
+                <a:spcPct val="20000"/>
+              </a:spcBef>
+              <a:buClr>
+                <a:schemeClr val="accent2">
+                  <a:lumMod val="75000"/>
+                </a:schemeClr>
+              </a:buClr>
+              <a:buFont typeface="Arial"/>
+              <a:buChar char="•"/>
+              <a:defRPr sz="3200" b="0" i="0" kern="1200">
+                <a:solidFill>
+                  <a:schemeClr val="tx1">
+                    <a:lumMod val="50000"/>
+                  </a:schemeClr>
+                </a:solidFill>
+                <a:latin typeface="Helvetica Light"/>
+                <a:ea typeface="+mn-ea"/>
+                <a:cs typeface="Helvetica Light"/>
+              </a:defRPr>
+            </a:lvl1pPr>
+            <a:lvl2pPr marL="742950" indent="-285750" algn="l" defTabSz="457200" rtl="0" eaLnBrk="1" latinLnBrk="0" hangingPunct="1">
+              <a:spcBef>
+                <a:spcPct val="20000"/>
+              </a:spcBef>
+              <a:buClr>
+                <a:schemeClr val="accent2">
+                  <a:lumMod val="75000"/>
+                </a:schemeClr>
+              </a:buClr>
+              <a:buFont typeface="Arial" panose="020B0604020202020204" pitchFamily="34" charset="0"/>
+              <a:buChar char="•"/>
+              <a:defRPr sz="2400" b="0" i="0" kern="1200">
+                <a:solidFill>
+                  <a:schemeClr val="tx1">
+                    <a:lumMod val="50000"/>
+                  </a:schemeClr>
+                </a:solidFill>
+                <a:latin typeface="Helvetica Light"/>
+                <a:ea typeface="+mn-ea"/>
+                <a:cs typeface="Helvetica Light"/>
+              </a:defRPr>
+            </a:lvl2pPr>
+            <a:lvl3pPr marL="1143000" indent="-228600" algn="l" defTabSz="457200" rtl="0" eaLnBrk="1" latinLnBrk="0" hangingPunct="1">
+              <a:spcBef>
+                <a:spcPct val="20000"/>
+              </a:spcBef>
+              <a:buClr>
+                <a:schemeClr val="accent2">
+                  <a:lumMod val="75000"/>
+                </a:schemeClr>
+              </a:buClr>
+              <a:buFont typeface="Arial"/>
+              <a:buChar char="•"/>
+              <a:defRPr sz="2400" b="0" i="0" kern="1200">
+                <a:solidFill>
+                  <a:schemeClr val="tx1">
+                    <a:lumMod val="50000"/>
+                  </a:schemeClr>
+                </a:solidFill>
+                <a:latin typeface="Helvetica Light"/>
+                <a:ea typeface="+mn-ea"/>
+                <a:cs typeface="Helvetica Light"/>
+              </a:defRPr>
+            </a:lvl3pPr>
+            <a:lvl4pPr marL="1600200" indent="-228600" algn="l" defTabSz="457200" rtl="0" eaLnBrk="1" latinLnBrk="0" hangingPunct="1">
+              <a:spcBef>
+                <a:spcPct val="20000"/>
+              </a:spcBef>
+              <a:buClr>
+                <a:schemeClr val="accent2">
+                  <a:lumMod val="75000"/>
+                </a:schemeClr>
+              </a:buClr>
+              <a:buFont typeface="Arial" panose="020B0604020202020204" pitchFamily="34" charset="0"/>
+              <a:buChar char="•"/>
+              <a:defRPr sz="2000" b="0" i="0" kern="1200">
+                <a:solidFill>
+                  <a:schemeClr val="tx1">
+                    <a:lumMod val="50000"/>
+                  </a:schemeClr>
+                </a:solidFill>
+                <a:latin typeface="Helvetica Light"/>
+                <a:ea typeface="+mn-ea"/>
+                <a:cs typeface="Helvetica Light"/>
+              </a:defRPr>
+            </a:lvl4pPr>
+            <a:lvl5pPr marL="2057400" indent="-228600" algn="l" defTabSz="457200" rtl="0" eaLnBrk="1" latinLnBrk="0" hangingPunct="1">
+              <a:spcBef>
+                <a:spcPct val="20000"/>
+              </a:spcBef>
+              <a:buClr>
+                <a:schemeClr val="accent2">
+                  <a:lumMod val="75000"/>
+                </a:schemeClr>
+              </a:buClr>
+              <a:buFont typeface="Arial" panose="020B0604020202020204" pitchFamily="34" charset="0"/>
+              <a:buChar char="•"/>
+              <a:defRPr sz="2000" b="0" i="0" kern="1200">
+                <a:solidFill>
+                  <a:schemeClr val="tx1">
+                    <a:lumMod val="50000"/>
+                  </a:schemeClr>
+                </a:solidFill>
+                <a:latin typeface="Helvetica Light"/>
+                <a:ea typeface="+mn-ea"/>
+                <a:cs typeface="Helvetica Light"/>
+              </a:defRPr>
+            </a:lvl5pPr>
+            <a:lvl6pPr marL="2514600" indent="-228600" algn="l" defTabSz="457200" rtl="0" eaLnBrk="1" latinLnBrk="0" hangingPunct="1">
+              <a:spcBef>
+                <a:spcPct val="20000"/>
+              </a:spcBef>
+              <a:buFont typeface="Arial"/>
+              <a:buChar char="•"/>
+              <a:defRPr sz="2000" kern="1200">
+                <a:solidFill>
+                  <a:schemeClr val="tx1"/>
+                </a:solidFill>
+                <a:latin typeface="+mn-lt"/>
+                <a:ea typeface="+mn-ea"/>
+                <a:cs typeface="+mn-cs"/>
+              </a:defRPr>
+            </a:lvl6pPr>
+            <a:lvl7pPr marL="2971800" indent="-228600" algn="l" defTabSz="457200" rtl="0" eaLnBrk="1" latinLnBrk="0" hangingPunct="1">
+              <a:spcBef>
+                <a:spcPct val="20000"/>
+              </a:spcBef>
+              <a:buFont typeface="Arial"/>
+              <a:buChar char="•"/>
+              <a:defRPr sz="2000" kern="1200">
+                <a:solidFill>
+                  <a:schemeClr val="tx1"/>
+                </a:solidFill>
+                <a:latin typeface="+mn-lt"/>
+                <a:ea typeface="+mn-ea"/>
+                <a:cs typeface="+mn-cs"/>
+              </a:defRPr>
+            </a:lvl7pPr>
+            <a:lvl8pPr marL="3429000" indent="-228600" algn="l" defTabSz="457200" rtl="0" eaLnBrk="1" latinLnBrk="0" hangingPunct="1">
+              <a:spcBef>
+                <a:spcPct val="20000"/>
+              </a:spcBef>
+              <a:buFont typeface="Arial"/>
+              <a:buChar char="•"/>
+              <a:defRPr sz="2000" kern="1200">
+                <a:solidFill>
+                  <a:schemeClr val="tx1"/>
+                </a:solidFill>
+                <a:latin typeface="+mn-lt"/>
+                <a:ea typeface="+mn-ea"/>
+                <a:cs typeface="+mn-cs"/>
+              </a:defRPr>
+            </a:lvl8pPr>
+            <a:lvl9pPr marL="3886200" indent="-228600" algn="l" defTabSz="457200" rtl="0" eaLnBrk="1" latinLnBrk="0" hangingPunct="1">
+              <a:spcBef>
+                <a:spcPct val="20000"/>
+              </a:spcBef>
+              <a:buFont typeface="Arial"/>
+              <a:buChar char="•"/>
+              <a:defRPr sz="2000" kern="1200">
+                <a:solidFill>
+                  <a:schemeClr val="tx1"/>
+                </a:solidFill>
+                <a:latin typeface="+mn-lt"/>
+                <a:ea typeface="+mn-ea"/>
+                <a:cs typeface="+mn-cs"/>
+              </a:defRPr>
+            </a:lvl9pPr>
+          </a:lstStyle>
+          <a:p>
+            <a:r>
+              <a:rPr lang="en-US">
+                <a:solidFill>
+                  <a:schemeClr val="tx1"/>
+                </a:solidFill>
+              </a:rPr>
+              <a:t>Why Quiz app?</a:t>
+            </a:r>
+            <a:endParaRPr lang="en-US" dirty="0">
+              <a:solidFill>
+                <a:schemeClr val="tx1"/>
+              </a:solidFill>
+            </a:endParaRPr>
+          </a:p>
+        </p:txBody>
+      </p:sp>
+    </p:spTree>
+    <p:extLst>
+      <p:ext uri="{BB962C8B-B14F-4D97-AF65-F5344CB8AC3E}">
+        <p14:creationId xmlns:p14="http://schemas.microsoft.com/office/powerpoint/2010/main" val="4197014828"/>
       </p:ext>
     </p:extLst>
   </p:cSld>
@@ -5824,23 +7600,21 @@
             <a:spLocks noGrp="1"/>
           </p:cNvSpPr>
           <p:nvPr>
-            <p:ph type="body" sz="quarter" idx="10"/>
+            <p:ph type="body" sz="quarter" idx="15"/>
           </p:nvPr>
         </p:nvSpPr>
-        <p:spPr>
-          <a:xfrm>
-            <a:off x="134470" y="393047"/>
-            <a:ext cx="2091766" cy="481640"/>
-          </a:xfrm>
-        </p:spPr>
+        <p:spPr/>
         <p:txBody>
           <a:bodyPr/>
           <a:lstStyle/>
           <a:p>
-            <a:pPr algn="ctr"/>
             <a:r>
-              <a:rPr lang="en-US" dirty="0"/>
-              <a:t>Data Point</a:t>
+              <a:rPr lang="en-US" dirty="0">
+                <a:solidFill>
+                  <a:schemeClr val="tx1"/>
+                </a:solidFill>
+              </a:rPr>
+              <a:t>Why Quiz app?</a:t>
             </a:r>
           </a:p>
         </p:txBody>
@@ -5852,50 +7626,19 @@
             <a:spLocks noGrp="1"/>
           </p:cNvSpPr>
           <p:nvPr>
-            <p:ph type="body" sz="quarter" idx="11"/>
+            <p:ph type="body" sz="quarter" idx="16"/>
           </p:nvPr>
         </p:nvSpPr>
         <p:spPr/>
         <p:txBody>
-          <a:bodyPr/>
+          <a:bodyPr>
+            <a:normAutofit lnSpcReduction="10000"/>
+          </a:bodyPr>
           <a:lstStyle/>
           <a:p>
             <a:r>
               <a:rPr lang="en-US" dirty="0"/>
-              <a:t>Describe Data Point</a:t>
-            </a:r>
-          </a:p>
-        </p:txBody>
-      </p:sp>
-      <p:sp>
-        <p:nvSpPr>
-          <p:cNvPr id="4" name="TextBox 3"/>
-          <p:cNvSpPr txBox="1"/>
-          <p:nvPr/>
-        </p:nvSpPr>
-        <p:spPr>
-          <a:xfrm>
-            <a:off x="556679" y="1509765"/>
-            <a:ext cx="3193555" cy="2646878"/>
-          </a:xfrm>
-          <a:prstGeom prst="rect">
-            <a:avLst/>
-          </a:prstGeom>
-          <a:noFill/>
-        </p:spPr>
-        <p:txBody>
-          <a:bodyPr wrap="square" rtlCol="0">
-            <a:spAutoFit/>
-          </a:bodyPr>
-          <a:lstStyle/>
-          <a:p>
-            <a:pPr algn="ctr"/>
-            <a:r>
-              <a:rPr lang="en-US" sz="16600" b="1" dirty="0">
-                <a:latin typeface="Arial"/>
-                <a:cs typeface="Arial"/>
-              </a:rPr>
-              <a:t>4x</a:t>
+              <a:t>PART FOUR</a:t>
             </a:r>
           </a:p>
         </p:txBody>
@@ -5903,7 +7646,7 @@
     </p:spTree>
     <p:extLst>
       <p:ext uri="{BB962C8B-B14F-4D97-AF65-F5344CB8AC3E}">
-        <p14:creationId xmlns:p14="http://schemas.microsoft.com/office/powerpoint/2010/main" val="1175957282"/>
+        <p14:creationId xmlns:p14="http://schemas.microsoft.com/office/powerpoint/2010/main" val="2672641676"/>
       </p:ext>
     </p:extLst>
   </p:cSld>

</xml_diff>

<commit_message>
deleted part four, changed part four to how?
</commit_message>
<xml_diff>
--- a/quizapp.pptx
+++ b/quizapp.pptx
@@ -5,10 +5,10 @@
     <p:sldMasterId id="2147483745" r:id="rId1"/>
   </p:sldMasterIdLst>
   <p:notesMasterIdLst>
-    <p:notesMasterId r:id="rId20"/>
+    <p:notesMasterId r:id="rId19"/>
   </p:notesMasterIdLst>
   <p:handoutMasterIdLst>
-    <p:handoutMasterId r:id="rId21"/>
+    <p:handoutMasterId r:id="rId20"/>
   </p:handoutMasterIdLst>
   <p:sldIdLst>
     <p:sldId id="308" r:id="rId2"/>
@@ -18,17 +18,16 @@
     <p:sldId id="305" r:id="rId6"/>
     <p:sldId id="323" r:id="rId7"/>
     <p:sldId id="325" r:id="rId8"/>
-    <p:sldId id="327" r:id="rId9"/>
-    <p:sldId id="326" r:id="rId10"/>
-    <p:sldId id="329" r:id="rId11"/>
-    <p:sldId id="328" r:id="rId12"/>
-    <p:sldId id="319" r:id="rId13"/>
-    <p:sldId id="330" r:id="rId14"/>
-    <p:sldId id="333" r:id="rId15"/>
-    <p:sldId id="295" r:id="rId16"/>
-    <p:sldId id="334" r:id="rId17"/>
-    <p:sldId id="316" r:id="rId18"/>
-    <p:sldId id="335" r:id="rId19"/>
+    <p:sldId id="326" r:id="rId9"/>
+    <p:sldId id="329" r:id="rId10"/>
+    <p:sldId id="328" r:id="rId11"/>
+    <p:sldId id="319" r:id="rId12"/>
+    <p:sldId id="330" r:id="rId13"/>
+    <p:sldId id="333" r:id="rId14"/>
+    <p:sldId id="295" r:id="rId15"/>
+    <p:sldId id="334" r:id="rId16"/>
+    <p:sldId id="316" r:id="rId17"/>
+    <p:sldId id="335" r:id="rId18"/>
   </p:sldIdLst>
   <p:sldSz cx="9144000" cy="5143500" type="screen16x9"/>
   <p:notesSz cx="6858000" cy="9144000"/>
@@ -139,7 +138,6 @@
             <p14:sldId id="305"/>
             <p14:sldId id="323"/>
             <p14:sldId id="325"/>
-            <p14:sldId id="327"/>
             <p14:sldId id="326"/>
             <p14:sldId id="329"/>
             <p14:sldId id="328"/>
@@ -4443,86 +4441,6 @@
           <a:chExt cx="0" cy="0"/>
         </a:xfrm>
       </p:grpSpPr>
-      <p:sp>
-        <p:nvSpPr>
-          <p:cNvPr id="2" name="Text Placeholder 1"/>
-          <p:cNvSpPr>
-            <a:spLocks noGrp="1"/>
-          </p:cNvSpPr>
-          <p:nvPr>
-            <p:ph type="body" sz="quarter" idx="15"/>
-          </p:nvPr>
-        </p:nvSpPr>
-        <p:spPr/>
-        <p:txBody>
-          <a:bodyPr/>
-          <a:lstStyle/>
-          <a:p>
-            <a:r>
-              <a:rPr lang="en-US" dirty="0">
-                <a:solidFill>
-                  <a:schemeClr val="tx1"/>
-                </a:solidFill>
-              </a:rPr>
-              <a:t>How?</a:t>
-            </a:r>
-          </a:p>
-        </p:txBody>
-      </p:sp>
-      <p:sp>
-        <p:nvSpPr>
-          <p:cNvPr id="3" name="Text Placeholder 2"/>
-          <p:cNvSpPr>
-            <a:spLocks noGrp="1"/>
-          </p:cNvSpPr>
-          <p:nvPr>
-            <p:ph type="body" sz="quarter" idx="16"/>
-          </p:nvPr>
-        </p:nvSpPr>
-        <p:spPr/>
-        <p:txBody>
-          <a:bodyPr>
-            <a:normAutofit fontScale="92500"/>
-          </a:bodyPr>
-          <a:lstStyle/>
-          <a:p>
-            <a:r>
-              <a:rPr lang="en-US" dirty="0"/>
-              <a:t>PART THREE</a:t>
-            </a:r>
-          </a:p>
-        </p:txBody>
-      </p:sp>
-    </p:spTree>
-    <p:extLst>
-      <p:ext uri="{BB962C8B-B14F-4D97-AF65-F5344CB8AC3E}">
-        <p14:creationId xmlns:p14="http://schemas.microsoft.com/office/powerpoint/2010/main" val="3490653498"/>
-      </p:ext>
-    </p:extLst>
-  </p:cSld>
-  <p:clrMapOvr>
-    <a:masterClrMapping/>
-  </p:clrMapOvr>
-</p:sld>
-</file>
-
-<file path=ppt/slides/slide11.xml><?xml version="1.0" encoding="utf-8"?>
-<p:sld xmlns:a="http://schemas.openxmlformats.org/drawingml/2006/main" xmlns:r="http://schemas.openxmlformats.org/officeDocument/2006/relationships" xmlns:p="http://schemas.openxmlformats.org/presentationml/2006/main">
-  <p:cSld>
-    <p:spTree>
-      <p:nvGrpSpPr>
-        <p:cNvPr id="1" name=""/>
-        <p:cNvGrpSpPr/>
-        <p:nvPr/>
-      </p:nvGrpSpPr>
-      <p:grpSpPr>
-        <a:xfrm>
-          <a:off x="0" y="0"/>
-          <a:ext cx="0" cy="0"/>
-          <a:chOff x="0" y="0"/>
-          <a:chExt cx="0" cy="0"/>
-        </a:xfrm>
-      </p:grpSpPr>
       <p:grpSp>
         <p:nvGrpSpPr>
           <p:cNvPr id="4" name="Group 3"/>
@@ -5324,7 +5242,7 @@
 </p:sld>
 </file>
 
-<file path=ppt/slides/slide12.xml><?xml version="1.0" encoding="utf-8"?>
+<file path=ppt/slides/slide11.xml><?xml version="1.0" encoding="utf-8"?>
 <p:sld xmlns:a="http://schemas.openxmlformats.org/drawingml/2006/main" xmlns:r="http://schemas.openxmlformats.org/officeDocument/2006/relationships" xmlns:p="http://schemas.openxmlformats.org/presentationml/2006/main">
   <p:cSld>
     <p:spTree>
@@ -5428,7 +5346,7 @@
 </p:sld>
 </file>
 
-<file path=ppt/slides/slide13.xml><?xml version="1.0" encoding="utf-8"?>
+<file path=ppt/slides/slide12.xml><?xml version="1.0" encoding="utf-8"?>
 <p:sld xmlns:a="http://schemas.openxmlformats.org/drawingml/2006/main" xmlns:r="http://schemas.openxmlformats.org/officeDocument/2006/relationships" xmlns:p="http://schemas.openxmlformats.org/presentationml/2006/main">
   <p:cSld>
     <p:spTree>
@@ -5548,7 +5466,7 @@
 </p:sld>
 </file>
 
-<file path=ppt/slides/slide14.xml><?xml version="1.0" encoding="utf-8"?>
+<file path=ppt/slides/slide13.xml><?xml version="1.0" encoding="utf-8"?>
 <p:sld xmlns:a="http://schemas.openxmlformats.org/drawingml/2006/main" xmlns:r="http://schemas.openxmlformats.org/officeDocument/2006/relationships" xmlns:p="http://schemas.openxmlformats.org/presentationml/2006/main">
   <p:cSld>
     <p:spTree>
@@ -5668,7 +5586,7 @@
 </p:sld>
 </file>
 
-<file path=ppt/slides/slide15.xml><?xml version="1.0" encoding="utf-8"?>
+<file path=ppt/slides/slide14.xml><?xml version="1.0" encoding="utf-8"?>
 <p:sld xmlns:a="http://schemas.openxmlformats.org/drawingml/2006/main" xmlns:r="http://schemas.openxmlformats.org/officeDocument/2006/relationships" xmlns:p="http://schemas.openxmlformats.org/presentationml/2006/main">
   <p:cSld>
     <p:spTree>
@@ -6270,7 +6188,7 @@
 </p:sld>
 </file>
 
-<file path=ppt/slides/slide16.xml><?xml version="1.0" encoding="utf-8"?>
+<file path=ppt/slides/slide15.xml><?xml version="1.0" encoding="utf-8"?>
 <p:sld xmlns:a="http://schemas.openxmlformats.org/drawingml/2006/main" xmlns:r="http://schemas.openxmlformats.org/officeDocument/2006/relationships" xmlns:p="http://schemas.openxmlformats.org/presentationml/2006/main">
   <p:cSld>
     <p:bg>
@@ -6685,7 +6603,7 @@
 </p:sld>
 </file>
 
-<file path=ppt/slides/slide17.xml><?xml version="1.0" encoding="utf-8"?>
+<file path=ppt/slides/slide16.xml><?xml version="1.0" encoding="utf-8"?>
 <p:sld xmlns:a="http://schemas.openxmlformats.org/drawingml/2006/main" xmlns:r="http://schemas.openxmlformats.org/officeDocument/2006/relationships" xmlns:p="http://schemas.openxmlformats.org/presentationml/2006/main">
   <p:cSld>
     <p:bg>
@@ -6769,7 +6687,7 @@
 </p:sld>
 </file>
 
-<file path=ppt/slides/slide18.xml><?xml version="1.0" encoding="utf-8"?>
+<file path=ppt/slides/slide17.xml><?xml version="1.0" encoding="utf-8"?>
 <p:sld xmlns:a="http://schemas.openxmlformats.org/drawingml/2006/main" xmlns:r="http://schemas.openxmlformats.org/officeDocument/2006/relationships" xmlns:p="http://schemas.openxmlformats.org/presentationml/2006/main">
   <p:cSld>
     <p:bg>
@@ -8077,86 +7995,6 @@
           <a:chExt cx="0" cy="0"/>
         </a:xfrm>
       </p:grpSpPr>
-      <p:sp>
-        <p:nvSpPr>
-          <p:cNvPr id="2" name="Text Placeholder 1"/>
-          <p:cNvSpPr>
-            <a:spLocks noGrp="1"/>
-          </p:cNvSpPr>
-          <p:nvPr>
-            <p:ph type="body" sz="quarter" idx="15"/>
-          </p:nvPr>
-        </p:nvSpPr>
-        <p:spPr/>
-        <p:txBody>
-          <a:bodyPr/>
-          <a:lstStyle/>
-          <a:p>
-            <a:r>
-              <a:rPr lang="en-US" dirty="0">
-                <a:solidFill>
-                  <a:schemeClr val="tx1"/>
-                </a:solidFill>
-              </a:rPr>
-              <a:t>Why Quiz app?</a:t>
-            </a:r>
-          </a:p>
-        </p:txBody>
-      </p:sp>
-      <p:sp>
-        <p:nvSpPr>
-          <p:cNvPr id="3" name="Text Placeholder 2"/>
-          <p:cNvSpPr>
-            <a:spLocks noGrp="1"/>
-          </p:cNvSpPr>
-          <p:nvPr>
-            <p:ph type="body" sz="quarter" idx="16"/>
-          </p:nvPr>
-        </p:nvSpPr>
-        <p:spPr/>
-        <p:txBody>
-          <a:bodyPr>
-            <a:normAutofit lnSpcReduction="10000"/>
-          </a:bodyPr>
-          <a:lstStyle/>
-          <a:p>
-            <a:r>
-              <a:rPr lang="en-US" dirty="0"/>
-              <a:t>PART FOUR</a:t>
-            </a:r>
-          </a:p>
-        </p:txBody>
-      </p:sp>
-    </p:spTree>
-    <p:extLst>
-      <p:ext uri="{BB962C8B-B14F-4D97-AF65-F5344CB8AC3E}">
-        <p14:creationId xmlns:p14="http://schemas.microsoft.com/office/powerpoint/2010/main" val="2672641676"/>
-      </p:ext>
-    </p:extLst>
-  </p:cSld>
-  <p:clrMapOvr>
-    <a:masterClrMapping/>
-  </p:clrMapOvr>
-</p:sld>
-</file>
-
-<file path=ppt/slides/slide9.xml><?xml version="1.0" encoding="utf-8"?>
-<p:sld xmlns:a="http://schemas.openxmlformats.org/drawingml/2006/main" xmlns:r="http://schemas.openxmlformats.org/officeDocument/2006/relationships" xmlns:p="http://schemas.openxmlformats.org/presentationml/2006/main">
-  <p:cSld>
-    <p:spTree>
-      <p:nvGrpSpPr>
-        <p:cNvPr id="1" name=""/>
-        <p:cNvGrpSpPr/>
-        <p:nvPr/>
-      </p:nvGrpSpPr>
-      <p:grpSpPr>
-        <a:xfrm>
-          <a:off x="0" y="0"/>
-          <a:ext cx="0" cy="0"/>
-          <a:chOff x="0" y="0"/>
-          <a:chExt cx="0" cy="0"/>
-        </a:xfrm>
-      </p:grpSpPr>
       <p:grpSp>
         <p:nvGrpSpPr>
           <p:cNvPr id="7" name="Group 6"/>
@@ -8525,6 +8363,86 @@
     <p:extLst>
       <p:ext uri="{BB962C8B-B14F-4D97-AF65-F5344CB8AC3E}">
         <p14:creationId xmlns:p14="http://schemas.microsoft.com/office/powerpoint/2010/main" val="4197014828"/>
+      </p:ext>
+    </p:extLst>
+  </p:cSld>
+  <p:clrMapOvr>
+    <a:masterClrMapping/>
+  </p:clrMapOvr>
+</p:sld>
+</file>
+
+<file path=ppt/slides/slide9.xml><?xml version="1.0" encoding="utf-8"?>
+<p:sld xmlns:a="http://schemas.openxmlformats.org/drawingml/2006/main" xmlns:r="http://schemas.openxmlformats.org/officeDocument/2006/relationships" xmlns:p="http://schemas.openxmlformats.org/presentationml/2006/main">
+  <p:cSld>
+    <p:spTree>
+      <p:nvGrpSpPr>
+        <p:cNvPr id="1" name=""/>
+        <p:cNvGrpSpPr/>
+        <p:nvPr/>
+      </p:nvGrpSpPr>
+      <p:grpSpPr>
+        <a:xfrm>
+          <a:off x="0" y="0"/>
+          <a:ext cx="0" cy="0"/>
+          <a:chOff x="0" y="0"/>
+          <a:chExt cx="0" cy="0"/>
+        </a:xfrm>
+      </p:grpSpPr>
+      <p:sp>
+        <p:nvSpPr>
+          <p:cNvPr id="2" name="Text Placeholder 1"/>
+          <p:cNvSpPr>
+            <a:spLocks noGrp="1"/>
+          </p:cNvSpPr>
+          <p:nvPr>
+            <p:ph type="body" sz="quarter" idx="15"/>
+          </p:nvPr>
+        </p:nvSpPr>
+        <p:spPr/>
+        <p:txBody>
+          <a:bodyPr/>
+          <a:lstStyle/>
+          <a:p>
+            <a:r>
+              <a:rPr lang="en-US" dirty="0">
+                <a:solidFill>
+                  <a:schemeClr val="tx1"/>
+                </a:solidFill>
+              </a:rPr>
+              <a:t>How?</a:t>
+            </a:r>
+          </a:p>
+        </p:txBody>
+      </p:sp>
+      <p:sp>
+        <p:nvSpPr>
+          <p:cNvPr id="3" name="Text Placeholder 2"/>
+          <p:cNvSpPr>
+            <a:spLocks noGrp="1"/>
+          </p:cNvSpPr>
+          <p:nvPr>
+            <p:ph type="body" sz="quarter" idx="16"/>
+          </p:nvPr>
+        </p:nvSpPr>
+        <p:spPr/>
+        <p:txBody>
+          <a:bodyPr>
+            <a:normAutofit lnSpcReduction="10000"/>
+          </a:bodyPr>
+          <a:lstStyle/>
+          <a:p>
+            <a:r>
+              <a:rPr lang="en-US" dirty="0"/>
+              <a:t>PART FOUR</a:t>
+            </a:r>
+          </a:p>
+        </p:txBody>
+      </p:sp>
+    </p:spTree>
+    <p:extLst>
+      <p:ext uri="{BB962C8B-B14F-4D97-AF65-F5344CB8AC3E}">
+        <p14:creationId xmlns:p14="http://schemas.microsoft.com/office/powerpoint/2010/main" val="3490653498"/>
       </p:ext>
     </p:extLst>
   </p:cSld>

</xml_diff>

<commit_message>
deleted slide 15 coz was repeated
</commit_message>
<xml_diff>
--- a/quizapp.pptx
+++ b/quizapp.pptx
@@ -5,10 +5,10 @@
     <p:sldMasterId id="2147483745" r:id="rId1"/>
   </p:sldMasterIdLst>
   <p:notesMasterIdLst>
-    <p:notesMasterId r:id="rId19"/>
+    <p:notesMasterId r:id="rId18"/>
   </p:notesMasterIdLst>
   <p:handoutMasterIdLst>
-    <p:handoutMasterId r:id="rId20"/>
+    <p:handoutMasterId r:id="rId19"/>
   </p:handoutMasterIdLst>
   <p:sldIdLst>
     <p:sldId id="308" r:id="rId2"/>
@@ -24,10 +24,9 @@
     <p:sldId id="319" r:id="rId12"/>
     <p:sldId id="330" r:id="rId13"/>
     <p:sldId id="333" r:id="rId14"/>
-    <p:sldId id="295" r:id="rId15"/>
-    <p:sldId id="334" r:id="rId16"/>
-    <p:sldId id="316" r:id="rId17"/>
-    <p:sldId id="335" r:id="rId18"/>
+    <p:sldId id="334" r:id="rId15"/>
+    <p:sldId id="316" r:id="rId16"/>
+    <p:sldId id="335" r:id="rId17"/>
   </p:sldIdLst>
   <p:sldSz cx="9144000" cy="5143500" type="screen16x9"/>
   <p:notesSz cx="6858000" cy="9144000"/>
@@ -144,7 +143,6 @@
             <p14:sldId id="319"/>
             <p14:sldId id="330"/>
             <p14:sldId id="333"/>
-            <p14:sldId id="295"/>
             <p14:sldId id="334"/>
             <p14:sldId id="316"/>
             <p14:sldId id="335"/>
@@ -5589,6 +5587,16 @@
 <file path=ppt/slides/slide14.xml><?xml version="1.0" encoding="utf-8"?>
 <p:sld xmlns:a="http://schemas.openxmlformats.org/drawingml/2006/main" xmlns:r="http://schemas.openxmlformats.org/officeDocument/2006/relationships" xmlns:p="http://schemas.openxmlformats.org/presentationml/2006/main">
   <p:cSld>
+    <p:bg>
+      <p:bgPr>
+        <a:solidFill>
+          <a:schemeClr val="accent2">
+            <a:lumMod val="50000"/>
+          </a:schemeClr>
+        </a:solidFill>
+        <a:effectLst/>
+      </p:bgPr>
+    </p:bg>
     <p:spTree>
       <p:nvGrpSpPr>
         <p:cNvPr id="1" name=""/>
@@ -5605,6 +5613,84 @@
       </p:grpSpPr>
       <p:sp>
         <p:nvSpPr>
+          <p:cNvPr id="2" name="Text Placeholder 1"/>
+          <p:cNvSpPr>
+            <a:spLocks noGrp="1"/>
+          </p:cNvSpPr>
+          <p:nvPr>
+            <p:ph type="body" sz="quarter" idx="4294967295"/>
+          </p:nvPr>
+        </p:nvSpPr>
+        <p:spPr>
+          <a:xfrm>
+            <a:off x="1285167" y="1017544"/>
+            <a:ext cx="7067150" cy="3737336"/>
+          </a:xfrm>
+        </p:spPr>
+        <p:txBody>
+          <a:bodyPr>
+            <a:noAutofit/>
+          </a:bodyPr>
+          <a:lstStyle/>
+          <a:p>
+            <a:pPr marL="0" indent="0">
+              <a:buNone/>
+            </a:pPr>
+            <a:r>
+              <a:rPr lang="en-US" sz="5400" dirty="0">
+                <a:solidFill>
+                  <a:srgbClr val="FFFFFF"/>
+                </a:solidFill>
+                <a:latin typeface="Cambria"/>
+                <a:cs typeface="Cambria"/>
+              </a:rPr>
+              <a:t>The crucial issue is not about asking questions,</a:t>
+            </a:r>
+          </a:p>
+          <a:p>
+            <a:pPr marL="0" indent="0">
+              <a:buNone/>
+            </a:pPr>
+            <a:r>
+              <a:rPr lang="en-IN" sz="5400" dirty="0">
+                <a:solidFill>
+                  <a:srgbClr val="FFFFFF"/>
+                </a:solidFill>
+                <a:latin typeface="Cambria"/>
+                <a:cs typeface="Cambria"/>
+              </a:rPr>
+              <a:t>I</a:t>
+            </a:r>
+            <a:r>
+              <a:rPr lang="en-US" sz="5400" dirty="0">
+                <a:solidFill>
+                  <a:srgbClr val="FFFFFF"/>
+                </a:solidFill>
+                <a:latin typeface="Cambria"/>
+                <a:cs typeface="Cambria"/>
+              </a:rPr>
+              <a:t>t is the spirit in which</a:t>
+            </a:r>
+          </a:p>
+          <a:p>
+            <a:pPr marL="0" indent="0">
+              <a:buNone/>
+            </a:pPr>
+            <a:r>
+              <a:rPr lang="en-US" sz="5400" dirty="0">
+                <a:solidFill>
+                  <a:srgbClr val="FFFFFF"/>
+                </a:solidFill>
+                <a:latin typeface="Cambria"/>
+                <a:cs typeface="Cambria"/>
+              </a:rPr>
+              <a:t>questions are asked.</a:t>
+            </a:r>
+          </a:p>
+        </p:txBody>
+      </p:sp>
+      <p:sp>
+        <p:nvSpPr>
           <p:cNvPr id="5" name="Right Triangle 4"/>
           <p:cNvSpPr/>
           <p:nvPr/>
@@ -5619,6 +5705,52 @@
           </a:prstGeom>
           <a:solidFill>
             <a:srgbClr val="76201E"/>
+          </a:solidFill>
+          <a:ln>
+            <a:noFill/>
+          </a:ln>
+        </p:spPr>
+        <p:style>
+          <a:lnRef idx="1">
+            <a:schemeClr val="accent1"/>
+          </a:lnRef>
+          <a:fillRef idx="3">
+            <a:schemeClr val="accent1"/>
+          </a:fillRef>
+          <a:effectRef idx="2">
+            <a:schemeClr val="accent1"/>
+          </a:effectRef>
+          <a:fontRef idx="minor">
+            <a:schemeClr val="lt1"/>
+          </a:fontRef>
+        </p:style>
+        <p:txBody>
+          <a:bodyPr rtlCol="0" anchor="ctr"/>
+          <a:lstStyle/>
+          <a:p>
+            <a:pPr algn="ctr"/>
+            <a:endParaRPr lang="en-US" dirty="0">
+              <a:latin typeface="Arial Narrow"/>
+            </a:endParaRPr>
+          </a:p>
+        </p:txBody>
+      </p:sp>
+      <p:sp>
+        <p:nvSpPr>
+          <p:cNvPr id="6" name="Rectangle 5"/>
+          <p:cNvSpPr/>
+          <p:nvPr/>
+        </p:nvSpPr>
+        <p:spPr>
+          <a:xfrm>
+            <a:off x="903600" y="635374"/>
+            <a:ext cx="2044096" cy="572594"/>
+          </a:xfrm>
+          <a:prstGeom prst="rect">
+            <a:avLst/>
+          </a:prstGeom>
+          <a:solidFill>
+            <a:srgbClr val="9C2A27"/>
           </a:solidFill>
           <a:ln>
             <a:noFill/>
@@ -5854,742 +5986,6 @@
           </a:p>
         </p:txBody>
       </p:sp>
-      <p:pic>
-        <p:nvPicPr>
-          <p:cNvPr id="11" name="Picture 10">
-            <a:extLst>
-              <a:ext uri="{FF2B5EF4-FFF2-40B4-BE49-F238E27FC236}">
-                <a16:creationId xmlns:a16="http://schemas.microsoft.com/office/drawing/2014/main" id="{3CA58C43-677F-4B2D-A37F-0AD30B9AC6E9}"/>
-              </a:ext>
-            </a:extLst>
-          </p:cNvPr>
-          <p:cNvPicPr/>
-          <p:nvPr/>
-        </p:nvPicPr>
-        <p:blipFill>
-          <a:blip r:embed="rId2">
-            <a:extLst>
-              <a:ext uri="{28A0092B-C50C-407E-A947-70E740481C1C}">
-                <a14:useLocalDpi xmlns:a14="http://schemas.microsoft.com/office/drawing/2010/main" val="0"/>
-              </a:ext>
-            </a:extLst>
-          </a:blip>
-          <a:srcRect/>
-          <a:stretch>
-            <a:fillRect/>
-          </a:stretch>
-        </p:blipFill>
-        <p:spPr bwMode="auto">
-          <a:xfrm>
-            <a:off x="0" y="0"/>
-            <a:ext cx="9144000" cy="5143499"/>
-          </a:xfrm>
-          <a:prstGeom prst="rect">
-            <a:avLst/>
-          </a:prstGeom>
-          <a:blipFill dpi="0" rotWithShape="1">
-            <a:blip r:embed="rId3">
-              <a:alphaModFix amt="0"/>
-            </a:blip>
-            <a:srcRect/>
-            <a:tile tx="0" ty="0" sx="100000" sy="100000" flip="none" algn="tl"/>
-          </a:blipFill>
-          <a:ln>
-            <a:noFill/>
-          </a:ln>
-        </p:spPr>
-      </p:pic>
-      <p:sp>
-        <p:nvSpPr>
-          <p:cNvPr id="12" name="Text Placeholder 1">
-            <a:extLst>
-              <a:ext uri="{FF2B5EF4-FFF2-40B4-BE49-F238E27FC236}">
-                <a16:creationId xmlns:a16="http://schemas.microsoft.com/office/drawing/2014/main" id="{8006DB8F-C268-4E5C-BC10-664879C42A24}"/>
-              </a:ext>
-            </a:extLst>
-          </p:cNvPr>
-          <p:cNvSpPr txBox="1">
-            <a:spLocks/>
-          </p:cNvSpPr>
-          <p:nvPr/>
-        </p:nvSpPr>
-        <p:spPr>
-          <a:xfrm>
-            <a:off x="801841" y="514624"/>
-            <a:ext cx="7067150" cy="3737336"/>
-          </a:xfrm>
-          <a:prstGeom prst="rect">
-            <a:avLst/>
-          </a:prstGeom>
-        </p:spPr>
-        <p:txBody>
-          <a:bodyPr vert="horz" lIns="91440" tIns="45720" rIns="91440" bIns="45720" rtlCol="0">
-            <a:noAutofit/>
-          </a:bodyPr>
-          <a:lstStyle>
-            <a:lvl1pPr marL="342900" indent="-342900" algn="l" defTabSz="457200" rtl="0" eaLnBrk="1" latinLnBrk="0" hangingPunct="1">
-              <a:spcBef>
-                <a:spcPct val="20000"/>
-              </a:spcBef>
-              <a:buClr>
-                <a:schemeClr val="accent2">
-                  <a:lumMod val="75000"/>
-                </a:schemeClr>
-              </a:buClr>
-              <a:buFont typeface="Arial"/>
-              <a:buChar char="•"/>
-              <a:defRPr sz="3200" b="0" i="0" kern="1200">
-                <a:solidFill>
-                  <a:schemeClr val="tx1">
-                    <a:lumMod val="50000"/>
-                  </a:schemeClr>
-                </a:solidFill>
-                <a:latin typeface="Helvetica Light"/>
-                <a:ea typeface="+mn-ea"/>
-                <a:cs typeface="Helvetica Light"/>
-              </a:defRPr>
-            </a:lvl1pPr>
-            <a:lvl2pPr marL="742950" indent="-285750" algn="l" defTabSz="457200" rtl="0" eaLnBrk="1" latinLnBrk="0" hangingPunct="1">
-              <a:spcBef>
-                <a:spcPct val="20000"/>
-              </a:spcBef>
-              <a:buClr>
-                <a:schemeClr val="accent2">
-                  <a:lumMod val="75000"/>
-                </a:schemeClr>
-              </a:buClr>
-              <a:buFont typeface="Arial" panose="020B0604020202020204" pitchFamily="34" charset="0"/>
-              <a:buChar char="•"/>
-              <a:defRPr sz="2400" b="0" i="0" kern="1200">
-                <a:solidFill>
-                  <a:schemeClr val="tx1">
-                    <a:lumMod val="50000"/>
-                  </a:schemeClr>
-                </a:solidFill>
-                <a:latin typeface="Helvetica Light"/>
-                <a:ea typeface="+mn-ea"/>
-                <a:cs typeface="Helvetica Light"/>
-              </a:defRPr>
-            </a:lvl2pPr>
-            <a:lvl3pPr marL="1143000" indent="-228600" algn="l" defTabSz="457200" rtl="0" eaLnBrk="1" latinLnBrk="0" hangingPunct="1">
-              <a:spcBef>
-                <a:spcPct val="20000"/>
-              </a:spcBef>
-              <a:buClr>
-                <a:schemeClr val="accent2">
-                  <a:lumMod val="75000"/>
-                </a:schemeClr>
-              </a:buClr>
-              <a:buFont typeface="Arial"/>
-              <a:buChar char="•"/>
-              <a:defRPr sz="2400" b="0" i="0" kern="1200">
-                <a:solidFill>
-                  <a:schemeClr val="tx1">
-                    <a:lumMod val="50000"/>
-                  </a:schemeClr>
-                </a:solidFill>
-                <a:latin typeface="Helvetica Light"/>
-                <a:ea typeface="+mn-ea"/>
-                <a:cs typeface="Helvetica Light"/>
-              </a:defRPr>
-            </a:lvl3pPr>
-            <a:lvl4pPr marL="1600200" indent="-228600" algn="l" defTabSz="457200" rtl="0" eaLnBrk="1" latinLnBrk="0" hangingPunct="1">
-              <a:spcBef>
-                <a:spcPct val="20000"/>
-              </a:spcBef>
-              <a:buClr>
-                <a:schemeClr val="accent2">
-                  <a:lumMod val="75000"/>
-                </a:schemeClr>
-              </a:buClr>
-              <a:buFont typeface="Arial" panose="020B0604020202020204" pitchFamily="34" charset="0"/>
-              <a:buChar char="•"/>
-              <a:defRPr sz="2000" b="0" i="0" kern="1200">
-                <a:solidFill>
-                  <a:schemeClr val="tx1">
-                    <a:lumMod val="50000"/>
-                  </a:schemeClr>
-                </a:solidFill>
-                <a:latin typeface="Helvetica Light"/>
-                <a:ea typeface="+mn-ea"/>
-                <a:cs typeface="Helvetica Light"/>
-              </a:defRPr>
-            </a:lvl4pPr>
-            <a:lvl5pPr marL="2057400" indent="-228600" algn="l" defTabSz="457200" rtl="0" eaLnBrk="1" latinLnBrk="0" hangingPunct="1">
-              <a:spcBef>
-                <a:spcPct val="20000"/>
-              </a:spcBef>
-              <a:buClr>
-                <a:schemeClr val="accent2">
-                  <a:lumMod val="75000"/>
-                </a:schemeClr>
-              </a:buClr>
-              <a:buFont typeface="Arial" panose="020B0604020202020204" pitchFamily="34" charset="0"/>
-              <a:buChar char="•"/>
-              <a:defRPr sz="2000" b="0" i="0" kern="1200">
-                <a:solidFill>
-                  <a:schemeClr val="tx1">
-                    <a:lumMod val="50000"/>
-                  </a:schemeClr>
-                </a:solidFill>
-                <a:latin typeface="Helvetica Light"/>
-                <a:ea typeface="+mn-ea"/>
-                <a:cs typeface="Helvetica Light"/>
-              </a:defRPr>
-            </a:lvl5pPr>
-            <a:lvl6pPr marL="2514600" indent="-228600" algn="l" defTabSz="457200" rtl="0" eaLnBrk="1" latinLnBrk="0" hangingPunct="1">
-              <a:spcBef>
-                <a:spcPct val="20000"/>
-              </a:spcBef>
-              <a:buFont typeface="Arial"/>
-              <a:buChar char="•"/>
-              <a:defRPr sz="2000" kern="1200">
-                <a:solidFill>
-                  <a:schemeClr val="tx1"/>
-                </a:solidFill>
-                <a:latin typeface="+mn-lt"/>
-                <a:ea typeface="+mn-ea"/>
-                <a:cs typeface="+mn-cs"/>
-              </a:defRPr>
-            </a:lvl6pPr>
-            <a:lvl7pPr marL="2971800" indent="-228600" algn="l" defTabSz="457200" rtl="0" eaLnBrk="1" latinLnBrk="0" hangingPunct="1">
-              <a:spcBef>
-                <a:spcPct val="20000"/>
-              </a:spcBef>
-              <a:buFont typeface="Arial"/>
-              <a:buChar char="•"/>
-              <a:defRPr sz="2000" kern="1200">
-                <a:solidFill>
-                  <a:schemeClr val="tx1"/>
-                </a:solidFill>
-                <a:latin typeface="+mn-lt"/>
-                <a:ea typeface="+mn-ea"/>
-                <a:cs typeface="+mn-cs"/>
-              </a:defRPr>
-            </a:lvl7pPr>
-            <a:lvl8pPr marL="3429000" indent="-228600" algn="l" defTabSz="457200" rtl="0" eaLnBrk="1" latinLnBrk="0" hangingPunct="1">
-              <a:spcBef>
-                <a:spcPct val="20000"/>
-              </a:spcBef>
-              <a:buFont typeface="Arial"/>
-              <a:buChar char="•"/>
-              <a:defRPr sz="2000" kern="1200">
-                <a:solidFill>
-                  <a:schemeClr val="tx1"/>
-                </a:solidFill>
-                <a:latin typeface="+mn-lt"/>
-                <a:ea typeface="+mn-ea"/>
-                <a:cs typeface="+mn-cs"/>
-              </a:defRPr>
-            </a:lvl8pPr>
-            <a:lvl9pPr marL="3886200" indent="-228600" algn="l" defTabSz="457200" rtl="0" eaLnBrk="1" latinLnBrk="0" hangingPunct="1">
-              <a:spcBef>
-                <a:spcPct val="20000"/>
-              </a:spcBef>
-              <a:buFont typeface="Arial"/>
-              <a:buChar char="•"/>
-              <a:defRPr sz="2000" kern="1200">
-                <a:solidFill>
-                  <a:schemeClr val="tx1"/>
-                </a:solidFill>
-                <a:latin typeface="+mn-lt"/>
-                <a:ea typeface="+mn-ea"/>
-                <a:cs typeface="+mn-cs"/>
-              </a:defRPr>
-            </a:lvl9pPr>
-          </a:lstStyle>
-          <a:p>
-            <a:pPr marL="0" indent="0">
-              <a:buFont typeface="Arial"/>
-              <a:buNone/>
-            </a:pPr>
-            <a:r>
-              <a:rPr lang="en-US" sz="5400">
-                <a:solidFill>
-                  <a:srgbClr val="FFFFFF"/>
-                </a:solidFill>
-                <a:latin typeface="Cambria"/>
-                <a:cs typeface="Cambria"/>
-              </a:rPr>
-              <a:t>The crucial issue is not about asking questions,</a:t>
-            </a:r>
-          </a:p>
-          <a:p>
-            <a:pPr marL="0" indent="0">
-              <a:buFont typeface="Arial"/>
-              <a:buNone/>
-            </a:pPr>
-            <a:r>
-              <a:rPr lang="en-IN" sz="5400">
-                <a:solidFill>
-                  <a:srgbClr val="FFFFFF"/>
-                </a:solidFill>
-                <a:latin typeface="Cambria"/>
-                <a:cs typeface="Cambria"/>
-              </a:rPr>
-              <a:t>I</a:t>
-            </a:r>
-            <a:r>
-              <a:rPr lang="en-US" sz="5400">
-                <a:solidFill>
-                  <a:srgbClr val="FFFFFF"/>
-                </a:solidFill>
-                <a:latin typeface="Cambria"/>
-                <a:cs typeface="Cambria"/>
-              </a:rPr>
-              <a:t>t is the spirit in which</a:t>
-            </a:r>
-          </a:p>
-          <a:p>
-            <a:pPr marL="0" indent="0">
-              <a:buFont typeface="Arial"/>
-              <a:buNone/>
-            </a:pPr>
-            <a:r>
-              <a:rPr lang="en-IN" sz="5400">
-                <a:solidFill>
-                  <a:srgbClr val="FFFFFF"/>
-                </a:solidFill>
-                <a:latin typeface="Cambria"/>
-                <a:cs typeface="Cambria"/>
-              </a:rPr>
-              <a:t>q</a:t>
-            </a:r>
-            <a:r>
-              <a:rPr lang="en-US" sz="5400">
-                <a:solidFill>
-                  <a:srgbClr val="FFFFFF"/>
-                </a:solidFill>
-                <a:latin typeface="Cambria"/>
-                <a:cs typeface="Cambria"/>
-              </a:rPr>
-              <a:t>uestions are asked.</a:t>
-            </a:r>
-            <a:endParaRPr lang="en-US" sz="5400" dirty="0">
-              <a:solidFill>
-                <a:srgbClr val="FFFFFF"/>
-              </a:solidFill>
-              <a:latin typeface="Cambria"/>
-              <a:cs typeface="Cambria"/>
-            </a:endParaRPr>
-          </a:p>
-        </p:txBody>
-      </p:sp>
-    </p:spTree>
-    <p:extLst>
-      <p:ext uri="{BB962C8B-B14F-4D97-AF65-F5344CB8AC3E}">
-        <p14:creationId xmlns:p14="http://schemas.microsoft.com/office/powerpoint/2010/main" val="437039837"/>
-      </p:ext>
-    </p:extLst>
-  </p:cSld>
-  <p:clrMapOvr>
-    <a:masterClrMapping/>
-  </p:clrMapOvr>
-</p:sld>
-</file>
-
-<file path=ppt/slides/slide15.xml><?xml version="1.0" encoding="utf-8"?>
-<p:sld xmlns:a="http://schemas.openxmlformats.org/drawingml/2006/main" xmlns:r="http://schemas.openxmlformats.org/officeDocument/2006/relationships" xmlns:p="http://schemas.openxmlformats.org/presentationml/2006/main">
-  <p:cSld>
-    <p:bg>
-      <p:bgPr>
-        <a:solidFill>
-          <a:schemeClr val="accent2">
-            <a:lumMod val="50000"/>
-          </a:schemeClr>
-        </a:solidFill>
-        <a:effectLst/>
-      </p:bgPr>
-    </p:bg>
-    <p:spTree>
-      <p:nvGrpSpPr>
-        <p:cNvPr id="1" name=""/>
-        <p:cNvGrpSpPr/>
-        <p:nvPr/>
-      </p:nvGrpSpPr>
-      <p:grpSpPr>
-        <a:xfrm>
-          <a:off x="0" y="0"/>
-          <a:ext cx="0" cy="0"/>
-          <a:chOff x="0" y="0"/>
-          <a:chExt cx="0" cy="0"/>
-        </a:xfrm>
-      </p:grpSpPr>
-      <p:sp>
-        <p:nvSpPr>
-          <p:cNvPr id="2" name="Text Placeholder 1"/>
-          <p:cNvSpPr>
-            <a:spLocks noGrp="1"/>
-          </p:cNvSpPr>
-          <p:nvPr>
-            <p:ph type="body" sz="quarter" idx="4294967295"/>
-          </p:nvPr>
-        </p:nvSpPr>
-        <p:spPr>
-          <a:xfrm>
-            <a:off x="1285167" y="1017544"/>
-            <a:ext cx="7067150" cy="3737336"/>
-          </a:xfrm>
-        </p:spPr>
-        <p:txBody>
-          <a:bodyPr>
-            <a:noAutofit/>
-          </a:bodyPr>
-          <a:lstStyle/>
-          <a:p>
-            <a:pPr marL="0" indent="0">
-              <a:buNone/>
-            </a:pPr>
-            <a:r>
-              <a:rPr lang="en-US" sz="5400" dirty="0">
-                <a:solidFill>
-                  <a:srgbClr val="FFFFFF"/>
-                </a:solidFill>
-                <a:latin typeface="Cambria"/>
-                <a:cs typeface="Cambria"/>
-              </a:rPr>
-              <a:t>The crucial issue is not about asking questions,</a:t>
-            </a:r>
-          </a:p>
-          <a:p>
-            <a:pPr marL="0" indent="0">
-              <a:buNone/>
-            </a:pPr>
-            <a:r>
-              <a:rPr lang="en-IN" sz="5400" dirty="0">
-                <a:solidFill>
-                  <a:srgbClr val="FFFFFF"/>
-                </a:solidFill>
-                <a:latin typeface="Cambria"/>
-                <a:cs typeface="Cambria"/>
-              </a:rPr>
-              <a:t>I</a:t>
-            </a:r>
-            <a:r>
-              <a:rPr lang="en-US" sz="5400" dirty="0">
-                <a:solidFill>
-                  <a:srgbClr val="FFFFFF"/>
-                </a:solidFill>
-                <a:latin typeface="Cambria"/>
-                <a:cs typeface="Cambria"/>
-              </a:rPr>
-              <a:t>t is the spirit in which</a:t>
-            </a:r>
-          </a:p>
-          <a:p>
-            <a:pPr marL="0" indent="0">
-              <a:buNone/>
-            </a:pPr>
-            <a:r>
-              <a:rPr lang="en-US" sz="5400" dirty="0">
-                <a:solidFill>
-                  <a:srgbClr val="FFFFFF"/>
-                </a:solidFill>
-                <a:latin typeface="Cambria"/>
-                <a:cs typeface="Cambria"/>
-              </a:rPr>
-              <a:t>questions are asked.</a:t>
-            </a:r>
-          </a:p>
-        </p:txBody>
-      </p:sp>
-      <p:sp>
-        <p:nvSpPr>
-          <p:cNvPr id="5" name="Right Triangle 4"/>
-          <p:cNvSpPr/>
-          <p:nvPr/>
-        </p:nvSpPr>
-        <p:spPr>
-          <a:xfrm rot="10800000">
-            <a:off x="903599" y="1207968"/>
-            <a:ext cx="447525" cy="338667"/>
-          </a:xfrm>
-          <a:prstGeom prst="rtTriangle">
-            <a:avLst/>
-          </a:prstGeom>
-          <a:solidFill>
-            <a:srgbClr val="76201E"/>
-          </a:solidFill>
-          <a:ln>
-            <a:noFill/>
-          </a:ln>
-        </p:spPr>
-        <p:style>
-          <a:lnRef idx="1">
-            <a:schemeClr val="accent1"/>
-          </a:lnRef>
-          <a:fillRef idx="3">
-            <a:schemeClr val="accent1"/>
-          </a:fillRef>
-          <a:effectRef idx="2">
-            <a:schemeClr val="accent1"/>
-          </a:effectRef>
-          <a:fontRef idx="minor">
-            <a:schemeClr val="lt1"/>
-          </a:fontRef>
-        </p:style>
-        <p:txBody>
-          <a:bodyPr rtlCol="0" anchor="ctr"/>
-          <a:lstStyle/>
-          <a:p>
-            <a:pPr algn="ctr"/>
-            <a:endParaRPr lang="en-US" dirty="0">
-              <a:latin typeface="Arial Narrow"/>
-            </a:endParaRPr>
-          </a:p>
-        </p:txBody>
-      </p:sp>
-      <p:sp>
-        <p:nvSpPr>
-          <p:cNvPr id="6" name="Rectangle 5"/>
-          <p:cNvSpPr/>
-          <p:nvPr/>
-        </p:nvSpPr>
-        <p:spPr>
-          <a:xfrm>
-            <a:off x="903600" y="635374"/>
-            <a:ext cx="2044096" cy="572594"/>
-          </a:xfrm>
-          <a:prstGeom prst="rect">
-            <a:avLst/>
-          </a:prstGeom>
-          <a:solidFill>
-            <a:srgbClr val="9C2A27"/>
-          </a:solidFill>
-          <a:ln>
-            <a:noFill/>
-          </a:ln>
-        </p:spPr>
-        <p:style>
-          <a:lnRef idx="1">
-            <a:schemeClr val="accent1"/>
-          </a:lnRef>
-          <a:fillRef idx="3">
-            <a:schemeClr val="accent1"/>
-          </a:fillRef>
-          <a:effectRef idx="2">
-            <a:schemeClr val="accent1"/>
-          </a:effectRef>
-          <a:fontRef idx="minor">
-            <a:schemeClr val="lt1"/>
-          </a:fontRef>
-        </p:style>
-        <p:txBody>
-          <a:bodyPr rtlCol="0" anchor="ctr"/>
-          <a:lstStyle/>
-          <a:p>
-            <a:pPr algn="ctr"/>
-            <a:endParaRPr lang="en-US" dirty="0">
-              <a:latin typeface="Arial Narrow"/>
-            </a:endParaRPr>
-          </a:p>
-        </p:txBody>
-      </p:sp>
-      <p:sp>
-        <p:nvSpPr>
-          <p:cNvPr id="9" name="Text Placeholder 2"/>
-          <p:cNvSpPr txBox="1">
-            <a:spLocks/>
-          </p:cNvSpPr>
-          <p:nvPr/>
-        </p:nvSpPr>
-        <p:spPr>
-          <a:xfrm>
-            <a:off x="1030909" y="679136"/>
-            <a:ext cx="2388190" cy="572594"/>
-          </a:xfrm>
-          <a:prstGeom prst="rect">
-            <a:avLst/>
-          </a:prstGeom>
-        </p:spPr>
-        <p:txBody>
-          <a:bodyPr/>
-          <a:lstStyle>
-            <a:lvl1pPr marL="342900" indent="-342900" algn="l" defTabSz="457200" rtl="0" eaLnBrk="1" latinLnBrk="0" hangingPunct="1">
-              <a:spcBef>
-                <a:spcPct val="20000"/>
-              </a:spcBef>
-              <a:buClr>
-                <a:schemeClr val="accent2">
-                  <a:lumMod val="75000"/>
-                </a:schemeClr>
-              </a:buClr>
-              <a:buFont typeface="Arial"/>
-              <a:buChar char="•"/>
-              <a:defRPr sz="3200" b="0" i="0" kern="1200">
-                <a:solidFill>
-                  <a:schemeClr val="tx1">
-                    <a:lumMod val="50000"/>
-                  </a:schemeClr>
-                </a:solidFill>
-                <a:latin typeface="Helvetica Light"/>
-                <a:ea typeface="+mn-ea"/>
-                <a:cs typeface="Helvetica Light"/>
-              </a:defRPr>
-            </a:lvl1pPr>
-            <a:lvl2pPr marL="742950" indent="-285750" algn="l" defTabSz="457200" rtl="0" eaLnBrk="1" latinLnBrk="0" hangingPunct="1">
-              <a:spcBef>
-                <a:spcPct val="20000"/>
-              </a:spcBef>
-              <a:buClr>
-                <a:schemeClr val="accent2">
-                  <a:lumMod val="75000"/>
-                </a:schemeClr>
-              </a:buClr>
-              <a:buFont typeface="Arial" panose="020B0604020202020204" pitchFamily="34" charset="0"/>
-              <a:buChar char="•"/>
-              <a:defRPr sz="2400" b="0" i="0" kern="1200">
-                <a:solidFill>
-                  <a:schemeClr val="tx1">
-                    <a:lumMod val="50000"/>
-                  </a:schemeClr>
-                </a:solidFill>
-                <a:latin typeface="Helvetica Light"/>
-                <a:ea typeface="+mn-ea"/>
-                <a:cs typeface="Helvetica Light"/>
-              </a:defRPr>
-            </a:lvl2pPr>
-            <a:lvl3pPr marL="1143000" indent="-228600" algn="l" defTabSz="457200" rtl="0" eaLnBrk="1" latinLnBrk="0" hangingPunct="1">
-              <a:spcBef>
-                <a:spcPct val="20000"/>
-              </a:spcBef>
-              <a:buClr>
-                <a:schemeClr val="accent2">
-                  <a:lumMod val="75000"/>
-                </a:schemeClr>
-              </a:buClr>
-              <a:buFont typeface="Arial"/>
-              <a:buChar char="•"/>
-              <a:defRPr sz="2400" b="0" i="0" kern="1200">
-                <a:solidFill>
-                  <a:schemeClr val="tx1">
-                    <a:lumMod val="50000"/>
-                  </a:schemeClr>
-                </a:solidFill>
-                <a:latin typeface="Helvetica Light"/>
-                <a:ea typeface="+mn-ea"/>
-                <a:cs typeface="Helvetica Light"/>
-              </a:defRPr>
-            </a:lvl3pPr>
-            <a:lvl4pPr marL="1600200" indent="-228600" algn="l" defTabSz="457200" rtl="0" eaLnBrk="1" latinLnBrk="0" hangingPunct="1">
-              <a:spcBef>
-                <a:spcPct val="20000"/>
-              </a:spcBef>
-              <a:buClr>
-                <a:schemeClr val="accent2">
-                  <a:lumMod val="75000"/>
-                </a:schemeClr>
-              </a:buClr>
-              <a:buFont typeface="Arial" panose="020B0604020202020204" pitchFamily="34" charset="0"/>
-              <a:buChar char="•"/>
-              <a:defRPr sz="2000" b="0" i="0" kern="1200">
-                <a:solidFill>
-                  <a:schemeClr val="tx1">
-                    <a:lumMod val="50000"/>
-                  </a:schemeClr>
-                </a:solidFill>
-                <a:latin typeface="Helvetica Light"/>
-                <a:ea typeface="+mn-ea"/>
-                <a:cs typeface="Helvetica Light"/>
-              </a:defRPr>
-            </a:lvl4pPr>
-            <a:lvl5pPr marL="2057400" indent="-228600" algn="l" defTabSz="457200" rtl="0" eaLnBrk="1" latinLnBrk="0" hangingPunct="1">
-              <a:spcBef>
-                <a:spcPct val="20000"/>
-              </a:spcBef>
-              <a:buClr>
-                <a:schemeClr val="accent2">
-                  <a:lumMod val="75000"/>
-                </a:schemeClr>
-              </a:buClr>
-              <a:buFont typeface="Arial" panose="020B0604020202020204" pitchFamily="34" charset="0"/>
-              <a:buChar char="•"/>
-              <a:defRPr sz="2000" b="0" i="0" kern="1200">
-                <a:solidFill>
-                  <a:schemeClr val="tx1">
-                    <a:lumMod val="50000"/>
-                  </a:schemeClr>
-                </a:solidFill>
-                <a:latin typeface="Helvetica Light"/>
-                <a:ea typeface="+mn-ea"/>
-                <a:cs typeface="Helvetica Light"/>
-              </a:defRPr>
-            </a:lvl5pPr>
-            <a:lvl6pPr marL="2514600" indent="-228600" algn="l" defTabSz="457200" rtl="0" eaLnBrk="1" latinLnBrk="0" hangingPunct="1">
-              <a:spcBef>
-                <a:spcPct val="20000"/>
-              </a:spcBef>
-              <a:buFont typeface="Arial"/>
-              <a:buChar char="•"/>
-              <a:defRPr sz="2000" kern="1200">
-                <a:solidFill>
-                  <a:schemeClr val="tx1"/>
-                </a:solidFill>
-                <a:latin typeface="+mn-lt"/>
-                <a:ea typeface="+mn-ea"/>
-                <a:cs typeface="+mn-cs"/>
-              </a:defRPr>
-            </a:lvl6pPr>
-            <a:lvl7pPr marL="2971800" indent="-228600" algn="l" defTabSz="457200" rtl="0" eaLnBrk="1" latinLnBrk="0" hangingPunct="1">
-              <a:spcBef>
-                <a:spcPct val="20000"/>
-              </a:spcBef>
-              <a:buFont typeface="Arial"/>
-              <a:buChar char="•"/>
-              <a:defRPr sz="2000" kern="1200">
-                <a:solidFill>
-                  <a:schemeClr val="tx1"/>
-                </a:solidFill>
-                <a:latin typeface="+mn-lt"/>
-                <a:ea typeface="+mn-ea"/>
-                <a:cs typeface="+mn-cs"/>
-              </a:defRPr>
-            </a:lvl7pPr>
-            <a:lvl8pPr marL="3429000" indent="-228600" algn="l" defTabSz="457200" rtl="0" eaLnBrk="1" latinLnBrk="0" hangingPunct="1">
-              <a:spcBef>
-                <a:spcPct val="20000"/>
-              </a:spcBef>
-              <a:buFont typeface="Arial"/>
-              <a:buChar char="•"/>
-              <a:defRPr sz="2000" kern="1200">
-                <a:solidFill>
-                  <a:schemeClr val="tx1"/>
-                </a:solidFill>
-                <a:latin typeface="+mn-lt"/>
-                <a:ea typeface="+mn-ea"/>
-                <a:cs typeface="+mn-cs"/>
-              </a:defRPr>
-            </a:lvl8pPr>
-            <a:lvl9pPr marL="3886200" indent="-228600" algn="l" defTabSz="457200" rtl="0" eaLnBrk="1" latinLnBrk="0" hangingPunct="1">
-              <a:spcBef>
-                <a:spcPct val="20000"/>
-              </a:spcBef>
-              <a:buFont typeface="Arial"/>
-              <a:buChar char="•"/>
-              <a:defRPr sz="2000" kern="1200">
-                <a:solidFill>
-                  <a:schemeClr val="tx1"/>
-                </a:solidFill>
-                <a:latin typeface="+mn-lt"/>
-                <a:ea typeface="+mn-ea"/>
-                <a:cs typeface="+mn-cs"/>
-              </a:defRPr>
-            </a:lvl9pPr>
-          </a:lstStyle>
-          <a:p>
-            <a:pPr marL="0" indent="0">
-              <a:buNone/>
-            </a:pPr>
-            <a:endParaRPr lang="en-US" sz="2400" dirty="0">
-              <a:solidFill>
-                <a:srgbClr val="FFFFFF"/>
-              </a:solidFill>
-              <a:latin typeface="Arial"/>
-              <a:cs typeface="Arial"/>
-            </a:endParaRPr>
-          </a:p>
-        </p:txBody>
-      </p:sp>
     </p:spTree>
     <p:extLst>
       <p:ext uri="{BB962C8B-B14F-4D97-AF65-F5344CB8AC3E}">
@@ -6603,7 +5999,7 @@
 </p:sld>
 </file>
 
-<file path=ppt/slides/slide16.xml><?xml version="1.0" encoding="utf-8"?>
+<file path=ppt/slides/slide15.xml><?xml version="1.0" encoding="utf-8"?>
 <p:sld xmlns:a="http://schemas.openxmlformats.org/drawingml/2006/main" xmlns:r="http://schemas.openxmlformats.org/officeDocument/2006/relationships" xmlns:p="http://schemas.openxmlformats.org/presentationml/2006/main">
   <p:cSld>
     <p:bg>
@@ -6687,7 +6083,7 @@
 </p:sld>
 </file>
 
-<file path=ppt/slides/slide17.xml><?xml version="1.0" encoding="utf-8"?>
+<file path=ppt/slides/slide16.xml><?xml version="1.0" encoding="utf-8"?>
 <p:sld xmlns:a="http://schemas.openxmlformats.org/drawingml/2006/main" xmlns:r="http://schemas.openxmlformats.org/officeDocument/2006/relationships" xmlns:p="http://schemas.openxmlformats.org/presentationml/2006/main">
   <p:cSld>
     <p:bg>

</xml_diff>